<commit_message>
Updated presentation - we are now over 400 contributors and 1000 forks
</commit_message>
<xml_diff>
--- a/gdc2023/GDC23_Presentation_SDL.pptx
+++ b/gdc2023/GDC23_Presentation_SDL.pptx
@@ -1269,6 +1269,72 @@
 </p:notes>
 </file>
 
+<file path=ppt/notesSlides/notesSlide18.xml><?xml version="1.0" encoding="utf-8"?>
+<p:notes xmlns:a="http://schemas.openxmlformats.org/drawingml/2006/main" xmlns:r="http://schemas.openxmlformats.org/officeDocument/2006/relationships" xmlns:p="http://schemas.openxmlformats.org/presentationml/2006/main">
+  <p:cSld>
+    <p:spTree>
+      <p:nvGrpSpPr>
+        <p:cNvPr id="1" name=""/>
+        <p:cNvGrpSpPr/>
+        <p:nvPr/>
+      </p:nvGrpSpPr>
+      <p:grpSpPr>
+        <a:xfrm>
+          <a:off x="0" y="0"/>
+          <a:ext cx="0" cy="0"/>
+          <a:chOff x="0" y="0"/>
+          <a:chExt cx="0" cy="0"/>
+        </a:xfrm>
+      </p:grpSpPr>
+      <p:sp>
+        <p:nvSpPr>
+          <p:cNvPr id="2" name="Slide Image Placeholder 1"/>
+          <p:cNvSpPr>
+            <a:spLocks noGrp="1" noRot="1" noChangeAspect="1"/>
+          </p:cNvSpPr>
+          <p:nvPr>
+            <p:ph type="sldImg"/>
+          </p:nvPr>
+        </p:nvSpPr>
+        <p:spPr>
+          <a:xfrm>
+            <a:off x="381000" y="685800"/>
+            <a:ext cx="6096000" cy="3429000"/>
+          </a:xfrm>
+        </p:spPr>
+      </p:sp>
+      <p:sp>
+        <p:nvSpPr>
+          <p:cNvPr id="3" name="Notes Placeholder 2"/>
+          <p:cNvSpPr>
+            <a:spLocks noGrp="1"/>
+          </p:cNvSpPr>
+          <p:nvPr>
+            <p:ph type="body" idx="1"/>
+          </p:nvPr>
+        </p:nvSpPr>
+        <p:spPr/>
+        <p:txBody>
+          <a:bodyPr/>
+          <a:lstStyle/>
+          <a:p>
+            <a:endParaRPr lang="en-US" dirty="0"/>
+          </a:p>
+        </p:txBody>
+      </p:sp>
+    </p:spTree>
+    <p:extLst>
+      <p:ext uri="{BB962C8B-B14F-4D97-AF65-F5344CB8AC3E}">
+        <p14:creationId xmlns:p14="http://schemas.microsoft.com/office/powerpoint/2010/main" val="3598629786"/>
+      </p:ext>
+    </p:extLst>
+  </p:cSld>
+  <p:clrMapOvr>
+    <a:masterClrMapping/>
+  </p:clrMapOvr>
+</p:notes>
+</file>
+
 <file path=ppt/notesSlides/notesSlide2.xml><?xml version="1.0" encoding="utf-8"?>
 <p:notes xmlns:a="http://schemas.openxmlformats.org/drawingml/2006/main" xmlns:r="http://schemas.openxmlformats.org/officeDocument/2006/relationships" xmlns:p="http://schemas.openxmlformats.org/presentationml/2006/main">
   <p:cSld>
@@ -1982,7 +2048,7 @@
           </a:ln>
           <a:extLst>
             <a:ext uri="{C572A759-6A51-4108-AA02-DFA0A04FC94B}">
-              <ma14:wrappingTextBoxFlag xmlns:ma14="http://schemas.microsoft.com/office/mac/drawingml/2011/main" xmlns:a14="http://schemas.microsoft.com/office/drawing/2010/main" xmlns:m="http://schemas.openxmlformats.org/officeDocument/2006/math" xmlns="" val="1"/>
+              <ma14:wrappingTextBoxFlag xmlns="" xmlns:m="http://schemas.openxmlformats.org/officeDocument/2006/math" xmlns:a14="http://schemas.microsoft.com/office/drawing/2010/main" xmlns:ma14="http://schemas.microsoft.com/office/mac/drawingml/2011/main" val="1"/>
             </a:ext>
           </a:extLst>
         </p:spPr>
@@ -2019,7 +2085,7 @@
           </a:ln>
           <a:extLst>
             <a:ext uri="{C572A759-6A51-4108-AA02-DFA0A04FC94B}">
-              <ma14:wrappingTextBoxFlag xmlns:ma14="http://schemas.microsoft.com/office/mac/drawingml/2011/main" xmlns:a14="http://schemas.microsoft.com/office/drawing/2010/main" xmlns:m="http://schemas.openxmlformats.org/officeDocument/2006/math" xmlns="" val="1"/>
+              <ma14:wrappingTextBoxFlag xmlns="" xmlns:m="http://schemas.openxmlformats.org/officeDocument/2006/math" xmlns:a14="http://schemas.microsoft.com/office/drawing/2010/main" xmlns:ma14="http://schemas.microsoft.com/office/mac/drawingml/2011/main" val="1"/>
             </a:ext>
           </a:extLst>
         </p:spPr>
@@ -2937,7 +3003,7 @@
           </a:ln>
           <a:extLst>
             <a:ext uri="{C572A759-6A51-4108-AA02-DFA0A04FC94B}">
-              <ma14:wrappingTextBoxFlag xmlns:ma14="http://schemas.microsoft.com/office/mac/drawingml/2011/main" xmlns:a14="http://schemas.microsoft.com/office/drawing/2010/main" xmlns:m="http://schemas.openxmlformats.org/officeDocument/2006/math" xmlns="" val="1"/>
+              <ma14:wrappingTextBoxFlag xmlns="" xmlns:m="http://schemas.openxmlformats.org/officeDocument/2006/math" xmlns:a14="http://schemas.microsoft.com/office/drawing/2010/main" xmlns:ma14="http://schemas.microsoft.com/office/mac/drawingml/2011/main" val="1"/>
             </a:ext>
           </a:extLst>
         </p:spPr>
@@ -7584,7 +7650,15 @@
           <a:p>
             <a:r>
               <a:rPr lang="en-US" dirty="0"/>
-              <a:t> SDL gives you a consistent way of handling high DPI scenarios across all supported operating systems</a:t>
+              <a:t> SDL gives you a consistent way of handling high DPI scenarios across </a:t>
+            </a:r>
+            <a:r>
+              <a:rPr lang="en-US"/>
+              <a:t>all operating </a:t>
+            </a:r>
+            <a:r>
+              <a:rPr lang="en-US" dirty="0"/>
+              <a:t>systems</a:t>
             </a:r>
           </a:p>
         </p:txBody>
@@ -9322,7 +9396,7 @@
           <p:nvPr/>
         </p:nvPicPr>
         <p:blipFill>
-          <a:blip r:embed="rId2">
+          <a:blip r:embed="rId3">
             <a:extLst>
               <a:ext uri="{28A0092B-C50C-407E-A947-70E740481C1C}">
                 <a14:useLocalDpi xmlns:a14="http://schemas.microsoft.com/office/drawing/2010/main" val="0"/>
@@ -10509,19 +10583,19 @@
           </a:lstStyle>
           <a:p>
             <a:r>
-              <a:rPr lang="en-US"/>
+              <a:rPr lang="en-US" dirty="0"/>
               <a:t> Moving to GitHub has greatly increased developer engagement and feedback, and has directly contributed to the move to SDL 3</a:t>
             </a:r>
           </a:p>
           <a:p>
             <a:r>
-              <a:rPr lang="en-US"/>
-              <a:t> There are almost 400 contributors and 1000 forks of the core library</a:t>
-            </a:r>
-          </a:p>
-          <a:p>
-            <a:r>
-              <a:rPr lang="en-US"/>
+              <a:rPr lang="en-US" dirty="0"/>
+              <a:t> There are over 400 contributors and 1000 forks of the core library</a:t>
+            </a:r>
+          </a:p>
+          <a:p>
+            <a:r>
+              <a:rPr lang="en-US" dirty="0"/>
               <a:t> Moving to GitHub has made it much easier to release quickly, and now we have a monthly cadence of stable release updates</a:t>
             </a:r>
           </a:p>

</xml_diff>

<commit_message>
Final presentation slides for our GDC talk
</commit_message>
<xml_diff>
--- a/gdc2023/GDC23_Presentation_SDL.pptx
+++ b/gdc2023/GDC23_Presentation_SDL.pptx
@@ -18,28 +18,28 @@
     <p:sldId id="263" r:id="rId9"/>
     <p:sldId id="264" r:id="rId10"/>
     <p:sldId id="266" r:id="rId11"/>
-    <p:sldId id="315" r:id="rId12"/>
-    <p:sldId id="316" r:id="rId13"/>
-    <p:sldId id="268" r:id="rId14"/>
-    <p:sldId id="267" r:id="rId15"/>
-    <p:sldId id="313" r:id="rId16"/>
-    <p:sldId id="314" r:id="rId17"/>
-    <p:sldId id="300" r:id="rId18"/>
-    <p:sldId id="269" r:id="rId19"/>
-    <p:sldId id="292" r:id="rId20"/>
-    <p:sldId id="283" r:id="rId21"/>
-    <p:sldId id="286" r:id="rId22"/>
-    <p:sldId id="303" r:id="rId23"/>
+    <p:sldId id="320" r:id="rId12"/>
+    <p:sldId id="315" r:id="rId13"/>
+    <p:sldId id="316" r:id="rId14"/>
+    <p:sldId id="268" r:id="rId15"/>
+    <p:sldId id="267" r:id="rId16"/>
+    <p:sldId id="313" r:id="rId17"/>
+    <p:sldId id="314" r:id="rId18"/>
+    <p:sldId id="300" r:id="rId19"/>
+    <p:sldId id="269" r:id="rId20"/>
+    <p:sldId id="292" r:id="rId21"/>
+    <p:sldId id="317" r:id="rId22"/>
+    <p:sldId id="286" r:id="rId23"/>
     <p:sldId id="291" r:id="rId24"/>
     <p:sldId id="301" r:id="rId25"/>
     <p:sldId id="270" r:id="rId26"/>
-    <p:sldId id="305" r:id="rId27"/>
-    <p:sldId id="299" r:id="rId28"/>
-    <p:sldId id="306" r:id="rId29"/>
-    <p:sldId id="287" r:id="rId30"/>
-    <p:sldId id="288" r:id="rId31"/>
-    <p:sldId id="289" r:id="rId32"/>
-    <p:sldId id="271" r:id="rId33"/>
+    <p:sldId id="318" r:id="rId27"/>
+    <p:sldId id="305" r:id="rId28"/>
+    <p:sldId id="299" r:id="rId29"/>
+    <p:sldId id="319" r:id="rId30"/>
+    <p:sldId id="306" r:id="rId31"/>
+    <p:sldId id="287" r:id="rId32"/>
+    <p:sldId id="288" r:id="rId33"/>
     <p:sldId id="293" r:id="rId34"/>
     <p:sldId id="302" r:id="rId35"/>
     <p:sldId id="273" r:id="rId36"/>
@@ -600,78 +600,7 @@
           <a:p>
             <a:r>
               <a:rPr lang="en-US" dirty="0"/>
-              <a:t>@1bsyl, Sylvain,</a:t>
-            </a:r>
-            <a:r>
-              <a:rPr lang="en-US" baseline="0" dirty="0"/>
-              <a:t> handles many miscellaneous cleanups and Android bug reports</a:t>
-            </a:r>
-          </a:p>
-          <a:p>
-            <a:r>
-              <a:rPr lang="en-US" baseline="0" dirty="0"/>
-              <a:t>@</a:t>
-            </a:r>
-            <a:r>
-              <a:rPr lang="en-US" baseline="0" dirty="0" err="1"/>
-              <a:t>Kontrabant</a:t>
-            </a:r>
-            <a:r>
-              <a:rPr lang="en-US" baseline="0" dirty="0"/>
-              <a:t>, Frank, is our resident Wayland guru</a:t>
-            </a:r>
-            <a:br>
-              <a:rPr lang="en-US" baseline="0" dirty="0"/>
-            </a:br>
-            <a:r>
-              <a:rPr lang="en-US" baseline="0" dirty="0"/>
-              <a:t>@</a:t>
-            </a:r>
-            <a:r>
-              <a:rPr lang="en-US" baseline="0" dirty="0" err="1"/>
-              <a:t>madebr</a:t>
-            </a:r>
-            <a:r>
-              <a:rPr lang="en-US" baseline="0" dirty="0"/>
-              <a:t>, </a:t>
-            </a:r>
-            <a:r>
-              <a:rPr lang="en-US" baseline="0" dirty="0" err="1"/>
-              <a:t>Maartin</a:t>
-            </a:r>
-            <a:r>
-              <a:rPr lang="en-US" baseline="0" dirty="0"/>
-              <a:t>, is our resident </a:t>
-            </a:r>
-            <a:r>
-              <a:rPr lang="en-US" baseline="0" dirty="0" err="1"/>
-              <a:t>CMake</a:t>
-            </a:r>
-            <a:r>
-              <a:rPr lang="en-US" baseline="0" dirty="0"/>
-              <a:t> guru</a:t>
-            </a:r>
-          </a:p>
-          <a:p>
-            <a:r>
-              <a:rPr lang="en-US" baseline="0" dirty="0"/>
-              <a:t>@</a:t>
-            </a:r>
-            <a:r>
-              <a:rPr lang="en-US" baseline="0" dirty="0" err="1"/>
-              <a:t>sezero</a:t>
-            </a:r>
-            <a:r>
-              <a:rPr lang="en-US" baseline="0" dirty="0"/>
-              <a:t>, </a:t>
-            </a:r>
-            <a:r>
-              <a:rPr lang="en-US" baseline="0" dirty="0" err="1"/>
-              <a:t>Ozkan</a:t>
-            </a:r>
-            <a:r>
-              <a:rPr lang="en-US" baseline="0" dirty="0"/>
-              <a:t>, makes sure our i‘s are dotted and t’s crossed</a:t>
+              <a:t>SDL takes the complexities of dealing directly with hardware out and lets you focus on your game development.</a:t>
             </a:r>
           </a:p>
         </p:txBody>
@@ -679,7 +608,7 @@
     </p:spTree>
     <p:extLst>
       <p:ext uri="{BB962C8B-B14F-4D97-AF65-F5344CB8AC3E}">
-        <p14:creationId xmlns:p14="http://schemas.microsoft.com/office/powerpoint/2010/main" val="1386952636"/>
+        <p14:creationId xmlns:p14="http://schemas.microsoft.com/office/powerpoint/2010/main" val="816520892"/>
       </p:ext>
     </p:extLst>
   </p:cSld>
@@ -708,13 +637,24 @@
       </p:grpSpPr>
       <p:sp>
         <p:nvSpPr>
-          <p:cNvPr id="2" name="Notes Placeholder 1">
-            <a:extLst>
-              <a:ext uri="{FF2B5EF4-FFF2-40B4-BE49-F238E27FC236}">
-                <a16:creationId xmlns:a16="http://schemas.microsoft.com/office/drawing/2014/main" id="{8C27EEFA-1815-416C-B781-D0A569E8E815}"/>
-              </a:ext>
-            </a:extLst>
-          </p:cNvPr>
+          <p:cNvPr id="2" name="Slide Image Placeholder 1"/>
+          <p:cNvSpPr>
+            <a:spLocks noGrp="1" noRot="1" noChangeAspect="1"/>
+          </p:cNvSpPr>
+          <p:nvPr>
+            <p:ph type="sldImg"/>
+          </p:nvPr>
+        </p:nvSpPr>
+        <p:spPr>
+          <a:xfrm>
+            <a:off x="381000" y="685800"/>
+            <a:ext cx="6096000" cy="3429000"/>
+          </a:xfrm>
+        </p:spPr>
+      </p:sp>
+      <p:sp>
+        <p:nvSpPr>
+          <p:cNvPr id="3" name="Notes Placeholder 2"/>
           <p:cNvSpPr>
             <a:spLocks noGrp="1"/>
           </p:cNvSpPr>
@@ -727,42 +667,16 @@
           <a:bodyPr/>
           <a:lstStyle/>
           <a:p>
-            <a:pPr marL="0" marR="0" lvl="0" indent="0" defTabSz="1625600" eaLnBrk="1" fontAlgn="auto" latinLnBrk="0" hangingPunct="1">
-              <a:lnSpc>
-                <a:spcPct val="100000"/>
-              </a:lnSpc>
-              <a:spcBef>
-                <a:spcPts val="700"/>
-              </a:spcBef>
-              <a:spcAft>
-                <a:spcPts val="0"/>
-              </a:spcAft>
-              <a:buClrTx/>
-              <a:buSzTx/>
-              <a:buFontTx/>
-              <a:buNone/>
-              <a:tabLst/>
-              <a:defRPr/>
-            </a:pPr>
-            <a:r>
-              <a:rPr lang="en-US" dirty="0"/>
-              <a:t>* On Apple platforms, scale will</a:t>
-            </a:r>
-            <a:r>
-              <a:rPr lang="en-US" baseline="0" dirty="0"/>
-              <a:t> always be an integer scale factor. On Windows this will be one of the standard desktop scales, 100%, 125%, 150%, etc.</a:t>
-            </a:r>
-            <a:endParaRPr lang="en-US" dirty="0"/>
-          </a:p>
-          <a:p>
-            <a:endParaRPr lang="en-US" dirty="0"/>
-          </a:p>
-          <a:p>
-            <a:endParaRPr lang="en-US" dirty="0"/>
+            <a:endParaRPr lang="en-US"/>
           </a:p>
         </p:txBody>
       </p:sp>
     </p:spTree>
+    <p:extLst>
+      <p:ext uri="{BB962C8B-B14F-4D97-AF65-F5344CB8AC3E}">
+        <p14:creationId xmlns:p14="http://schemas.microsoft.com/office/powerpoint/2010/main" val="1654121100"/>
+      </p:ext>
+    </p:extLst>
   </p:cSld>
   <p:clrMapOvr>
     <a:masterClrMapping/>
@@ -821,25 +735,16 @@
           <a:p>
             <a:r>
               <a:rPr lang="en-US" dirty="0"/>
-              <a:t>* Windows maintain their screen coordinate sizes when moved between displays with different scales or when display scale changes</a:t>
-            </a:r>
-          </a:p>
-          <a:p>
-            <a:r>
-              <a:rPr lang="en-US" dirty="0"/>
-              <a:t>*</a:t>
-            </a:r>
-            <a:r>
-              <a:rPr lang="en-US" baseline="0" dirty="0"/>
-              <a:t> Standardizing on points allows consistent UI coordinate systems regardless of display density, becoming more important in 8K and 16K displays</a:t>
-            </a:r>
+              <a:t>* Screen coordinates are also known as points or Device Independent Pixels</a:t>
+            </a:r>
+            <a:endParaRPr lang="en-US" baseline="0" dirty="0"/>
           </a:p>
         </p:txBody>
       </p:sp>
     </p:spTree>
     <p:extLst>
       <p:ext uri="{BB962C8B-B14F-4D97-AF65-F5344CB8AC3E}">
-        <p14:creationId xmlns:p14="http://schemas.microsoft.com/office/powerpoint/2010/main" val="206462474"/>
+        <p14:creationId xmlns:p14="http://schemas.microsoft.com/office/powerpoint/2010/main" val="1009389639"/>
       </p:ext>
     </p:extLst>
   </p:cSld>
@@ -898,22 +803,34 @@
           <a:bodyPr/>
           <a:lstStyle/>
           <a:p>
-            <a:r>
-              <a:rPr lang="en-US"/>
-              <a:t>* SDL_ConvertEventToRenderCoordinates() converts</a:t>
-            </a:r>
-            <a:r>
-              <a:rPr lang="en-US" baseline="0"/>
-              <a:t> mouse coordinates and touch coordinates</a:t>
-            </a:r>
-            <a:endParaRPr lang="en-US" dirty="0"/>
+            <a:pPr marL="0" marR="0" lvl="0" indent="0" defTabSz="1625600" eaLnBrk="1" fontAlgn="auto" latinLnBrk="0" hangingPunct="1">
+              <a:lnSpc>
+                <a:spcPct val="100000"/>
+              </a:lnSpc>
+              <a:spcBef>
+                <a:spcPts val="700"/>
+              </a:spcBef>
+              <a:spcAft>
+                <a:spcPts val="0"/>
+              </a:spcAft>
+              <a:buClrTx/>
+              <a:buSzTx/>
+              <a:buFontTx/>
+              <a:buNone/>
+              <a:tabLst/>
+              <a:defRPr/>
+            </a:pPr>
+            <a:r>
+              <a:rPr lang="en-US" dirty="0"/>
+              <a:t>* Windows maintain their screen coordinate sizes when moved between displays with different scales or when display scale changes</a:t>
+            </a:r>
           </a:p>
         </p:txBody>
       </p:sp>
     </p:spTree>
     <p:extLst>
       <p:ext uri="{BB962C8B-B14F-4D97-AF65-F5344CB8AC3E}">
-        <p14:creationId xmlns:p14="http://schemas.microsoft.com/office/powerpoint/2010/main" val="2622552871"/>
+        <p14:creationId xmlns:p14="http://schemas.microsoft.com/office/powerpoint/2010/main" val="1776909563"/>
       </p:ext>
     </p:extLst>
   </p:cSld>
@@ -942,24 +859,13 @@
       </p:grpSpPr>
       <p:sp>
         <p:nvSpPr>
-          <p:cNvPr id="2" name="Slide Image Placeholder 1"/>
-          <p:cNvSpPr>
-            <a:spLocks noGrp="1" noRot="1" noChangeAspect="1"/>
-          </p:cNvSpPr>
-          <p:nvPr>
-            <p:ph type="sldImg"/>
-          </p:nvPr>
-        </p:nvSpPr>
-        <p:spPr>
-          <a:xfrm>
-            <a:off x="381000" y="685800"/>
-            <a:ext cx="6096000" cy="3429000"/>
-          </a:xfrm>
-        </p:spPr>
-      </p:sp>
-      <p:sp>
-        <p:nvSpPr>
-          <p:cNvPr id="3" name="Notes Placeholder 2"/>
+          <p:cNvPr id="2" name="Notes Placeholder 1">
+            <a:extLst>
+              <a:ext uri="{FF2B5EF4-FFF2-40B4-BE49-F238E27FC236}">
+                <a16:creationId xmlns:a16="http://schemas.microsoft.com/office/drawing/2014/main" id="{8C27EEFA-1815-416C-B781-D0A569E8E815}"/>
+              </a:ext>
+            </a:extLst>
+          </p:cNvPr>
           <p:cNvSpPr>
             <a:spLocks noGrp="1"/>
           </p:cNvSpPr>
@@ -972,32 +878,42 @@
           <a:bodyPr/>
           <a:lstStyle/>
           <a:p>
-            <a:r>
-              <a:rPr lang="en-US"/>
-              <a:t>* </a:t>
-            </a:r>
-            <a:r>
-              <a:rPr lang="en-US" err="1"/>
-              <a:t>SDL_ConvertEventToRenderCoordinates</a:t>
-            </a:r>
-            <a:r>
-              <a:rPr lang="en-US"/>
-              <a:t>() converts</a:t>
-            </a:r>
-            <a:r>
-              <a:rPr lang="en-US" baseline="0"/>
-              <a:t> mouse coordinates and touch coordinates</a:t>
-            </a:r>
-            <a:endParaRPr lang="en-US"/>
+            <a:pPr marL="0" marR="0" lvl="0" indent="0" defTabSz="1625600" eaLnBrk="1" fontAlgn="auto" latinLnBrk="0" hangingPunct="1">
+              <a:lnSpc>
+                <a:spcPct val="100000"/>
+              </a:lnSpc>
+              <a:spcBef>
+                <a:spcPts val="700"/>
+              </a:spcBef>
+              <a:spcAft>
+                <a:spcPts val="0"/>
+              </a:spcAft>
+              <a:buClrTx/>
+              <a:buSzTx/>
+              <a:buFontTx/>
+              <a:buNone/>
+              <a:tabLst/>
+              <a:defRPr/>
+            </a:pPr>
+            <a:r>
+              <a:rPr lang="en-US" dirty="0"/>
+              <a:t>* On Apple platforms, scale will</a:t>
+            </a:r>
+            <a:r>
+              <a:rPr lang="en-US" baseline="0" dirty="0"/>
+              <a:t> always be an integer scale factor. On Windows this will be one of the standard desktop scales, 100%, 125%, 150%, etc.</a:t>
+            </a:r>
+            <a:endParaRPr lang="en-US" dirty="0"/>
+          </a:p>
+          <a:p>
+            <a:endParaRPr lang="en-US" dirty="0"/>
+          </a:p>
+          <a:p>
+            <a:endParaRPr lang="en-US" dirty="0"/>
           </a:p>
         </p:txBody>
       </p:sp>
     </p:spTree>
-    <p:extLst>
-      <p:ext uri="{BB962C8B-B14F-4D97-AF65-F5344CB8AC3E}">
-        <p14:creationId xmlns:p14="http://schemas.microsoft.com/office/powerpoint/2010/main" val="1990343726"/>
-      </p:ext>
-    </p:extLst>
   </p:cSld>
   <p:clrMapOvr>
     <a:masterClrMapping/>
@@ -1054,14 +970,42 @@
           <a:bodyPr/>
           <a:lstStyle/>
           <a:p>
-            <a:endParaRPr lang="en-US"/>
+            <a:pPr marL="0" marR="0" lvl="0" indent="0" defTabSz="1625600" eaLnBrk="1" fontAlgn="auto" latinLnBrk="0" hangingPunct="1">
+              <a:lnSpc>
+                <a:spcPct val="100000"/>
+              </a:lnSpc>
+              <a:spcBef>
+                <a:spcPts val="700"/>
+              </a:spcBef>
+              <a:spcAft>
+                <a:spcPts val="0"/>
+              </a:spcAft>
+              <a:buClrTx/>
+              <a:buSzTx/>
+              <a:buFontTx/>
+              <a:buNone/>
+              <a:tabLst/>
+              <a:defRPr/>
+            </a:pPr>
+            <a:r>
+              <a:rPr lang="en-US" baseline="0" dirty="0"/>
+              <a:t>The display scale will be 1x, 2x, etc. for </a:t>
+            </a:r>
+            <a:r>
+              <a:rPr lang="en-US" baseline="0" dirty="0" err="1"/>
+              <a:t>fullscreen</a:t>
+            </a:r>
+            <a:r>
+              <a:rPr lang="en-US" baseline="0" dirty="0"/>
+              <a:t> modes, and will be the desktop scale for desktop modes.</a:t>
+            </a:r>
           </a:p>
         </p:txBody>
       </p:sp>
     </p:spTree>
     <p:extLst>
       <p:ext uri="{BB962C8B-B14F-4D97-AF65-F5344CB8AC3E}">
-        <p14:creationId xmlns:p14="http://schemas.microsoft.com/office/powerpoint/2010/main" val="2645731300"/>
+        <p14:creationId xmlns:p14="http://schemas.microsoft.com/office/powerpoint/2010/main" val="206462474"/>
       </p:ext>
     </p:extLst>
   </p:cSld>
@@ -1120,6 +1064,23 @@
           <a:bodyPr/>
           <a:lstStyle/>
           <a:p>
+            <a:pPr marL="0" marR="0" lvl="0" indent="0" defTabSz="1625600" eaLnBrk="1" fontAlgn="auto" latinLnBrk="0" hangingPunct="1">
+              <a:lnSpc>
+                <a:spcPct val="100000"/>
+              </a:lnSpc>
+              <a:spcBef>
+                <a:spcPts val="700"/>
+              </a:spcBef>
+              <a:spcAft>
+                <a:spcPts val="0"/>
+              </a:spcAft>
+              <a:buClrTx/>
+              <a:buSzTx/>
+              <a:buFontTx/>
+              <a:buNone/>
+              <a:tabLst/>
+              <a:defRPr/>
+            </a:pPr>
             <a:endParaRPr lang="en-US" dirty="0"/>
           </a:p>
         </p:txBody>
@@ -1127,7 +1088,7 @@
     </p:spTree>
     <p:extLst>
       <p:ext uri="{BB962C8B-B14F-4D97-AF65-F5344CB8AC3E}">
-        <p14:creationId xmlns:p14="http://schemas.microsoft.com/office/powerpoint/2010/main" val="3957670739"/>
+        <p14:creationId xmlns:p14="http://schemas.microsoft.com/office/powerpoint/2010/main" val="1618388056"/>
       </p:ext>
     </p:extLst>
   </p:cSld>
@@ -1186,14 +1147,34 @@
           <a:bodyPr/>
           <a:lstStyle/>
           <a:p>
-            <a:endParaRPr lang="en-US" dirty="0"/>
+            <a:pPr marL="0" marR="0" lvl="0" indent="0" defTabSz="1625600" eaLnBrk="1" fontAlgn="auto" latinLnBrk="0" hangingPunct="1">
+              <a:lnSpc>
+                <a:spcPct val="100000"/>
+              </a:lnSpc>
+              <a:spcBef>
+                <a:spcPts val="700"/>
+              </a:spcBef>
+              <a:spcAft>
+                <a:spcPts val="0"/>
+              </a:spcAft>
+              <a:buClrTx/>
+              <a:buSzTx/>
+              <a:buFontTx/>
+              <a:buNone/>
+              <a:tabLst/>
+              <a:defRPr/>
+            </a:pPr>
+            <a:r>
+              <a:rPr lang="en-US" dirty="0"/>
+              <a:t>* On the SDL GDC page we have a link to a code example of getting the desktop display scale</a:t>
+            </a:r>
           </a:p>
         </p:txBody>
       </p:sp>
     </p:spTree>
     <p:extLst>
       <p:ext uri="{BB962C8B-B14F-4D97-AF65-F5344CB8AC3E}">
-        <p14:creationId xmlns:p14="http://schemas.microsoft.com/office/powerpoint/2010/main" val="3438825012"/>
+        <p14:creationId xmlns:p14="http://schemas.microsoft.com/office/powerpoint/2010/main" val="2622552871"/>
       </p:ext>
     </p:extLst>
   </p:cSld>
@@ -1252,6 +1233,22 @@
           <a:bodyPr/>
           <a:lstStyle/>
           <a:p>
+            <a:r>
+              <a:rPr lang="en-US"/>
+              <a:t>* </a:t>
+            </a:r>
+            <a:r>
+              <a:rPr lang="en-US" err="1"/>
+              <a:t>SDL_ConvertEventToRenderCoordinates</a:t>
+            </a:r>
+            <a:r>
+              <a:rPr lang="en-US"/>
+              <a:t>() converts</a:t>
+            </a:r>
+            <a:r>
+              <a:rPr lang="en-US" baseline="0"/>
+              <a:t> mouse coordinates and touch coordinates</a:t>
+            </a:r>
             <a:endParaRPr lang="en-US"/>
           </a:p>
         </p:txBody>
@@ -1259,7 +1256,7 @@
     </p:spTree>
     <p:extLst>
       <p:ext uri="{BB962C8B-B14F-4D97-AF65-F5344CB8AC3E}">
-        <p14:creationId xmlns:p14="http://schemas.microsoft.com/office/powerpoint/2010/main" val="1552907196"/>
+        <p14:creationId xmlns:p14="http://schemas.microsoft.com/office/powerpoint/2010/main" val="1990343726"/>
       </p:ext>
     </p:extLst>
   </p:cSld>
@@ -1325,7 +1322,76 @@
     </p:spTree>
     <p:extLst>
       <p:ext uri="{BB962C8B-B14F-4D97-AF65-F5344CB8AC3E}">
-        <p14:creationId xmlns:p14="http://schemas.microsoft.com/office/powerpoint/2010/main" val="3598629786"/>
+        <p14:creationId xmlns:p14="http://schemas.microsoft.com/office/powerpoint/2010/main" val="2645731300"/>
+      </p:ext>
+    </p:extLst>
+  </p:cSld>
+  <p:clrMapOvr>
+    <a:masterClrMapping/>
+  </p:clrMapOvr>
+</p:notes>
+</file>
+
+<file path=ppt/notesSlides/notesSlide19.xml><?xml version="1.0" encoding="utf-8"?>
+<p:notes xmlns:a="http://schemas.openxmlformats.org/drawingml/2006/main" xmlns:r="http://schemas.openxmlformats.org/officeDocument/2006/relationships" xmlns:p="http://schemas.openxmlformats.org/presentationml/2006/main">
+  <p:cSld>
+    <p:spTree>
+      <p:nvGrpSpPr>
+        <p:cNvPr id="1" name=""/>
+        <p:cNvGrpSpPr/>
+        <p:nvPr/>
+      </p:nvGrpSpPr>
+      <p:grpSpPr>
+        <a:xfrm>
+          <a:off x="0" y="0"/>
+          <a:ext cx="0" cy="0"/>
+          <a:chOff x="0" y="0"/>
+          <a:chExt cx="0" cy="0"/>
+        </a:xfrm>
+      </p:grpSpPr>
+      <p:sp>
+        <p:nvSpPr>
+          <p:cNvPr id="2" name="Slide Image Placeholder 1"/>
+          <p:cNvSpPr>
+            <a:spLocks noGrp="1" noRot="1" noChangeAspect="1"/>
+          </p:cNvSpPr>
+          <p:nvPr>
+            <p:ph type="sldImg"/>
+          </p:nvPr>
+        </p:nvSpPr>
+        <p:spPr>
+          <a:xfrm>
+            <a:off x="381000" y="685800"/>
+            <a:ext cx="6096000" cy="3429000"/>
+          </a:xfrm>
+        </p:spPr>
+      </p:sp>
+      <p:sp>
+        <p:nvSpPr>
+          <p:cNvPr id="3" name="Notes Placeholder 2"/>
+          <p:cNvSpPr>
+            <a:spLocks noGrp="1"/>
+          </p:cNvSpPr>
+          <p:nvPr>
+            <p:ph type="body" idx="1"/>
+          </p:nvPr>
+        </p:nvSpPr>
+        <p:spPr/>
+        <p:txBody>
+          <a:bodyPr/>
+          <a:lstStyle/>
+          <a:p>
+            <a:r>
+              <a:rPr lang="en-US" dirty="0"/>
+              <a:t>You are guaranteed to get a pixel size changed event after your window is created.</a:t>
+            </a:r>
+          </a:p>
+        </p:txBody>
+      </p:sp>
+    </p:spTree>
+    <p:extLst>
+      <p:ext uri="{BB962C8B-B14F-4D97-AF65-F5344CB8AC3E}">
+        <p14:creationId xmlns:p14="http://schemas.microsoft.com/office/powerpoint/2010/main" val="1552907196"/>
       </p:ext>
     </p:extLst>
   </p:cSld>
@@ -1385,21 +1451,219 @@
           <a:lstStyle/>
           <a:p>
             <a:r>
-              <a:rPr lang="en-US"/>
-              <a:t>* SDL is actually used in Source 1 as well, but</a:t>
-            </a:r>
-            <a:r>
-              <a:rPr lang="en-US" baseline="0"/>
-              <a:t> only on Linux and for controller support. SDL is fully used for all platforms in Source 2.</a:t>
-            </a:r>
-            <a:endParaRPr lang="en-US"/>
+              <a:rPr lang="en-US" dirty="0"/>
+              <a:t>@1bsyl, Sylvain,</a:t>
+            </a:r>
+            <a:r>
+              <a:rPr lang="en-US" baseline="0" dirty="0"/>
+              <a:t> handles many miscellaneous cleanups and Android bug reports</a:t>
+            </a:r>
+          </a:p>
+          <a:p>
+            <a:r>
+              <a:rPr lang="en-US" baseline="0" dirty="0"/>
+              <a:t>@</a:t>
+            </a:r>
+            <a:r>
+              <a:rPr lang="en-US" baseline="0" dirty="0" err="1"/>
+              <a:t>Kontrabant</a:t>
+            </a:r>
+            <a:r>
+              <a:rPr lang="en-US" baseline="0" dirty="0"/>
+              <a:t>, Frank, is our resident Wayland guru</a:t>
+            </a:r>
+            <a:br>
+              <a:rPr lang="en-US" baseline="0" dirty="0"/>
+            </a:br>
+            <a:r>
+              <a:rPr lang="en-US" baseline="0" dirty="0"/>
+              <a:t>@</a:t>
+            </a:r>
+            <a:r>
+              <a:rPr lang="en-US" baseline="0" dirty="0" err="1"/>
+              <a:t>madebr</a:t>
+            </a:r>
+            <a:r>
+              <a:rPr lang="en-US" baseline="0" dirty="0"/>
+              <a:t>, </a:t>
+            </a:r>
+            <a:r>
+              <a:rPr lang="en-US" baseline="0" dirty="0" err="1"/>
+              <a:t>Maartin</a:t>
+            </a:r>
+            <a:r>
+              <a:rPr lang="en-US" baseline="0" dirty="0"/>
+              <a:t>, is our resident </a:t>
+            </a:r>
+            <a:r>
+              <a:rPr lang="en-US" baseline="0" dirty="0" err="1"/>
+              <a:t>CMake</a:t>
+            </a:r>
+            <a:r>
+              <a:rPr lang="en-US" baseline="0" dirty="0"/>
+              <a:t> guru</a:t>
+            </a:r>
+          </a:p>
+          <a:p>
+            <a:r>
+              <a:rPr lang="en-US" baseline="0" dirty="0"/>
+              <a:t>@</a:t>
+            </a:r>
+            <a:r>
+              <a:rPr lang="en-US" baseline="0" dirty="0" err="1"/>
+              <a:t>sezero</a:t>
+            </a:r>
+            <a:r>
+              <a:rPr lang="en-US" baseline="0" dirty="0"/>
+              <a:t>, </a:t>
+            </a:r>
+            <a:r>
+              <a:rPr lang="en-US" baseline="0" dirty="0" err="1"/>
+              <a:t>Ozkan</a:t>
+            </a:r>
+            <a:r>
+              <a:rPr lang="en-US" baseline="0" dirty="0"/>
+              <a:t>, makes sure our i‘s are dotted and t’s crossed</a:t>
+            </a:r>
           </a:p>
         </p:txBody>
       </p:sp>
     </p:spTree>
     <p:extLst>
       <p:ext uri="{BB962C8B-B14F-4D97-AF65-F5344CB8AC3E}">
-        <p14:creationId xmlns:p14="http://schemas.microsoft.com/office/powerpoint/2010/main" val="4013448026"/>
+        <p14:creationId xmlns:p14="http://schemas.microsoft.com/office/powerpoint/2010/main" val="1386952636"/>
+      </p:ext>
+    </p:extLst>
+  </p:cSld>
+  <p:clrMapOvr>
+    <a:masterClrMapping/>
+  </p:clrMapOvr>
+</p:notes>
+</file>
+
+<file path=ppt/notesSlides/notesSlide20.xml><?xml version="1.0" encoding="utf-8"?>
+<p:notes xmlns:a="http://schemas.openxmlformats.org/drawingml/2006/main" xmlns:r="http://schemas.openxmlformats.org/officeDocument/2006/relationships" xmlns:p="http://schemas.openxmlformats.org/presentationml/2006/main">
+  <p:cSld>
+    <p:spTree>
+      <p:nvGrpSpPr>
+        <p:cNvPr id="1" name=""/>
+        <p:cNvGrpSpPr/>
+        <p:nvPr/>
+      </p:nvGrpSpPr>
+      <p:grpSpPr>
+        <a:xfrm>
+          <a:off x="0" y="0"/>
+          <a:ext cx="0" cy="0"/>
+          <a:chOff x="0" y="0"/>
+          <a:chExt cx="0" cy="0"/>
+        </a:xfrm>
+      </p:grpSpPr>
+      <p:sp>
+        <p:nvSpPr>
+          <p:cNvPr id="2" name="Slide Image Placeholder 1"/>
+          <p:cNvSpPr>
+            <a:spLocks noGrp="1" noRot="1" noChangeAspect="1"/>
+          </p:cNvSpPr>
+          <p:nvPr>
+            <p:ph type="sldImg"/>
+          </p:nvPr>
+        </p:nvSpPr>
+        <p:spPr>
+          <a:xfrm>
+            <a:off x="381000" y="685800"/>
+            <a:ext cx="6096000" cy="3429000"/>
+          </a:xfrm>
+        </p:spPr>
+      </p:sp>
+      <p:sp>
+        <p:nvSpPr>
+          <p:cNvPr id="3" name="Notes Placeholder 2"/>
+          <p:cNvSpPr>
+            <a:spLocks noGrp="1"/>
+          </p:cNvSpPr>
+          <p:nvPr>
+            <p:ph type="body" idx="1"/>
+          </p:nvPr>
+        </p:nvSpPr>
+        <p:spPr/>
+        <p:txBody>
+          <a:bodyPr/>
+          <a:lstStyle/>
+          <a:p>
+            <a:endParaRPr lang="en-US" dirty="0"/>
+          </a:p>
+        </p:txBody>
+      </p:sp>
+    </p:spTree>
+    <p:extLst>
+      <p:ext uri="{BB962C8B-B14F-4D97-AF65-F5344CB8AC3E}">
+        <p14:creationId xmlns:p14="http://schemas.microsoft.com/office/powerpoint/2010/main" val="3598629786"/>
+      </p:ext>
+    </p:extLst>
+  </p:cSld>
+  <p:clrMapOvr>
+    <a:masterClrMapping/>
+  </p:clrMapOvr>
+</p:notes>
+</file>
+
+<file path=ppt/notesSlides/notesSlide21.xml><?xml version="1.0" encoding="utf-8"?>
+<p:notes xmlns:a="http://schemas.openxmlformats.org/drawingml/2006/main" xmlns:r="http://schemas.openxmlformats.org/officeDocument/2006/relationships" xmlns:p="http://schemas.openxmlformats.org/presentationml/2006/main">
+  <p:cSld>
+    <p:spTree>
+      <p:nvGrpSpPr>
+        <p:cNvPr id="1" name=""/>
+        <p:cNvGrpSpPr/>
+        <p:nvPr/>
+      </p:nvGrpSpPr>
+      <p:grpSpPr>
+        <a:xfrm>
+          <a:off x="0" y="0"/>
+          <a:ext cx="0" cy="0"/>
+          <a:chOff x="0" y="0"/>
+          <a:chExt cx="0" cy="0"/>
+        </a:xfrm>
+      </p:grpSpPr>
+      <p:sp>
+        <p:nvSpPr>
+          <p:cNvPr id="2" name="Slide Image Placeholder 1"/>
+          <p:cNvSpPr>
+            <a:spLocks noGrp="1" noRot="1" noChangeAspect="1"/>
+          </p:cNvSpPr>
+          <p:nvPr>
+            <p:ph type="sldImg"/>
+          </p:nvPr>
+        </p:nvSpPr>
+        <p:spPr>
+          <a:xfrm>
+            <a:off x="381000" y="685800"/>
+            <a:ext cx="6096000" cy="3429000"/>
+          </a:xfrm>
+        </p:spPr>
+      </p:sp>
+      <p:sp>
+        <p:nvSpPr>
+          <p:cNvPr id="3" name="Notes Placeholder 2"/>
+          <p:cNvSpPr>
+            <a:spLocks noGrp="1"/>
+          </p:cNvSpPr>
+          <p:nvPr>
+            <p:ph type="body" idx="1"/>
+          </p:nvPr>
+        </p:nvSpPr>
+        <p:spPr/>
+        <p:txBody>
+          <a:bodyPr/>
+          <a:lstStyle/>
+          <a:p>
+            <a:endParaRPr lang="en-US" dirty="0"/>
+          </a:p>
+        </p:txBody>
+      </p:sp>
+    </p:spTree>
+    <p:extLst>
+      <p:ext uri="{BB962C8B-B14F-4D97-AF65-F5344CB8AC3E}">
+        <p14:creationId xmlns:p14="http://schemas.microsoft.com/office/powerpoint/2010/main" val="2968188249"/>
       </p:ext>
     </p:extLst>
   </p:cSld>
@@ -1460,26 +1724,11 @@
           <a:p>
             <a:r>
               <a:rPr lang="en-US"/>
-              <a:t>* Warping can also run into problems where you hit the edge of the window, or in rare cases, escape the</a:t>
+              <a:t>* SDL is actually used in Source 1 as well, but</a:t>
             </a:r>
             <a:r>
               <a:rPr lang="en-US" baseline="0"/>
-              <a:t> window</a:t>
-            </a:r>
-            <a:br>
-              <a:rPr lang="en-US" baseline="0"/>
-            </a:br>
-            <a:r>
-              <a:rPr lang="en-US" baseline="0"/>
-              <a:t>* </a:t>
-            </a:r>
-            <a:r>
-              <a:rPr lang="en-US"/>
-              <a:t>RDP coalesces mouse updates and if</a:t>
-            </a:r>
-            <a:r>
-              <a:rPr lang="en-US" baseline="0"/>
-              <a:t> you set position you often won’t get back that same position </a:t>
+              <a:t> only on Linux and for controller support. SDL is fully used for all platforms in Source 2.</a:t>
             </a:r>
             <a:endParaRPr lang="en-US"/>
           </a:p>
@@ -1488,7 +1737,7 @@
     </p:spTree>
     <p:extLst>
       <p:ext uri="{BB962C8B-B14F-4D97-AF65-F5344CB8AC3E}">
-        <p14:creationId xmlns:p14="http://schemas.microsoft.com/office/powerpoint/2010/main" val="768717235"/>
+        <p14:creationId xmlns:p14="http://schemas.microsoft.com/office/powerpoint/2010/main" val="4013448026"/>
       </p:ext>
     </p:extLst>
   </p:cSld>
@@ -1548,36 +1797,24 @@
           <a:lstStyle/>
           <a:p>
             <a:r>
-              <a:rPr lang="en-US"/>
-              <a:t>* Warping can also run into problems where you hit the edge of the window, or in rare cases, escape the</a:t>
-            </a:r>
-            <a:r>
-              <a:rPr lang="en-US" baseline="0"/>
-              <a:t> window</a:t>
-            </a:r>
-            <a:br>
-              <a:rPr lang="en-US" baseline="0"/>
-            </a:br>
-            <a:r>
-              <a:rPr lang="en-US" baseline="0"/>
-              <a:t>* </a:t>
-            </a:r>
-            <a:r>
-              <a:rPr lang="en-US"/>
-              <a:t>RDP coalesces mouse updates and if</a:t>
-            </a:r>
-            <a:r>
-              <a:rPr lang="en-US" baseline="0"/>
-              <a:t> you set position you often won’t get back that same position </a:t>
-            </a:r>
-            <a:endParaRPr lang="en-US"/>
+              <a:rPr lang="en-US" dirty="0"/>
+              <a:t>* SDL has always been open source, it started out as LGPL and then moved to the </a:t>
+            </a:r>
+            <a:r>
+              <a:rPr lang="en-US" dirty="0" err="1"/>
+              <a:t>Zlib</a:t>
+            </a:r>
+            <a:r>
+              <a:rPr lang="en-US" dirty="0"/>
+              <a:t> license.</a:t>
+            </a:r>
           </a:p>
         </p:txBody>
       </p:sp>
     </p:spTree>
     <p:extLst>
       <p:ext uri="{BB962C8B-B14F-4D97-AF65-F5344CB8AC3E}">
-        <p14:creationId xmlns:p14="http://schemas.microsoft.com/office/powerpoint/2010/main" val="3081295226"/>
+        <p14:creationId xmlns:p14="http://schemas.microsoft.com/office/powerpoint/2010/main" val="233424605"/>
       </p:ext>
     </p:extLst>
   </p:cSld>
@@ -1636,14 +1873,14 @@
           <a:bodyPr/>
           <a:lstStyle/>
           <a:p>
-            <a:endParaRPr lang="en-US"/>
+            <a:endParaRPr lang="en-US" dirty="0"/>
           </a:p>
         </p:txBody>
       </p:sp>
     </p:spTree>
     <p:extLst>
       <p:ext uri="{BB962C8B-B14F-4D97-AF65-F5344CB8AC3E}">
-        <p14:creationId xmlns:p14="http://schemas.microsoft.com/office/powerpoint/2010/main" val="4024427629"/>
+        <p14:creationId xmlns:p14="http://schemas.microsoft.com/office/powerpoint/2010/main" val="2123649337"/>
       </p:ext>
     </p:extLst>
   </p:cSld>
@@ -1702,14 +1939,14 @@
           <a:bodyPr/>
           <a:lstStyle/>
           <a:p>
-            <a:endParaRPr lang="en-US"/>
+            <a:endParaRPr lang="en-US" dirty="0"/>
           </a:p>
         </p:txBody>
       </p:sp>
     </p:spTree>
     <p:extLst>
       <p:ext uri="{BB962C8B-B14F-4D97-AF65-F5344CB8AC3E}">
-        <p14:creationId xmlns:p14="http://schemas.microsoft.com/office/powerpoint/2010/main" val="3332013481"/>
+        <p14:creationId xmlns:p14="http://schemas.microsoft.com/office/powerpoint/2010/main" val="768717235"/>
       </p:ext>
     </p:extLst>
   </p:cSld>
@@ -1736,7 +1973,76 @@
           <a:chExt cx="0" cy="0"/>
         </a:xfrm>
       </p:grpSpPr>
+      <p:sp>
+        <p:nvSpPr>
+          <p:cNvPr id="2" name="Slide Image Placeholder 1"/>
+          <p:cNvSpPr>
+            <a:spLocks noGrp="1" noRot="1" noChangeAspect="1"/>
+          </p:cNvSpPr>
+          <p:nvPr>
+            <p:ph type="sldImg"/>
+          </p:nvPr>
+        </p:nvSpPr>
+        <p:spPr>
+          <a:xfrm>
+            <a:off x="381000" y="685800"/>
+            <a:ext cx="6096000" cy="3429000"/>
+          </a:xfrm>
+        </p:spPr>
+      </p:sp>
+      <p:sp>
+        <p:nvSpPr>
+          <p:cNvPr id="3" name="Notes Placeholder 2"/>
+          <p:cNvSpPr>
+            <a:spLocks noGrp="1"/>
+          </p:cNvSpPr>
+          <p:nvPr>
+            <p:ph type="body" idx="1"/>
+          </p:nvPr>
+        </p:nvSpPr>
+        <p:spPr/>
+        <p:txBody>
+          <a:bodyPr/>
+          <a:lstStyle/>
+          <a:p>
+            <a:r>
+              <a:rPr lang="en-US" dirty="0"/>
+              <a:t>* Warping can also run into problems where you hit the edge of the window, or in rare cases, escape the</a:t>
+            </a:r>
+            <a:r>
+              <a:rPr lang="en-US" baseline="0" dirty="0"/>
+              <a:t> window</a:t>
+            </a:r>
+            <a:br>
+              <a:rPr lang="en-US" baseline="0" dirty="0"/>
+            </a:br>
+            <a:r>
+              <a:rPr lang="en-US" baseline="0" dirty="0"/>
+              <a:t>* </a:t>
+            </a:r>
+            <a:r>
+              <a:rPr lang="en-US" dirty="0"/>
+              <a:t>RDP coalesces mouse updates and if</a:t>
+            </a:r>
+            <a:r>
+              <a:rPr lang="en-US" baseline="0" dirty="0"/>
+              <a:t> you set position you often won’t get back that same position</a:t>
+            </a:r>
+          </a:p>
+          <a:p>
+            <a:r>
+              <a:rPr lang="en-US" dirty="0"/>
+              <a:t>* Even locally, Windows will just drop the warp if it comes in exactly when mouse input occurs, and this is a big issue with high resolution mice</a:t>
+            </a:r>
+          </a:p>
+        </p:txBody>
+      </p:sp>
     </p:spTree>
+    <p:extLst>
+      <p:ext uri="{BB962C8B-B14F-4D97-AF65-F5344CB8AC3E}">
+        <p14:creationId xmlns:p14="http://schemas.microsoft.com/office/powerpoint/2010/main" val="3081295226"/>
+      </p:ext>
+    </p:extLst>
   </p:cSld>
   <p:clrMapOvr>
     <a:masterClrMapping/>
@@ -1793,14 +2099,14 @@
           <a:bodyPr/>
           <a:lstStyle/>
           <a:p>
-            <a:endParaRPr lang="en-US"/>
+            <a:endParaRPr lang="en-US" dirty="0"/>
           </a:p>
         </p:txBody>
       </p:sp>
     </p:spTree>
     <p:extLst>
       <p:ext uri="{BB962C8B-B14F-4D97-AF65-F5344CB8AC3E}">
-        <p14:creationId xmlns:p14="http://schemas.microsoft.com/office/powerpoint/2010/main" val="1654121100"/>
+        <p14:creationId xmlns:p14="http://schemas.microsoft.com/office/powerpoint/2010/main" val="1778790725"/>
       </p:ext>
     </p:extLst>
   </p:cSld>
@@ -1859,18 +2165,37 @@
           <a:bodyPr/>
           <a:lstStyle/>
           <a:p>
-            <a:r>
-              <a:rPr lang="en-US" dirty="0"/>
-              <a:t>* Screen coordinates are also known as points or Device Independent Pixels</a:t>
-            </a:r>
-            <a:endParaRPr lang="en-US" baseline="0" dirty="0"/>
+            <a:pPr marL="0" marR="0" lvl="0" indent="0" defTabSz="1625600" eaLnBrk="1" fontAlgn="auto" latinLnBrk="0" hangingPunct="1">
+              <a:lnSpc>
+                <a:spcPct val="100000"/>
+              </a:lnSpc>
+              <a:spcBef>
+                <a:spcPts val="700"/>
+              </a:spcBef>
+              <a:spcAft>
+                <a:spcPts val="0"/>
+              </a:spcAft>
+              <a:buClrTx/>
+              <a:buSzTx/>
+              <a:buFontTx/>
+              <a:buNone/>
+              <a:tabLst/>
+              <a:defRPr/>
+            </a:pPr>
+            <a:r>
+              <a:rPr lang="en-US" dirty="0"/>
+              <a:t>* On the SDL GDC page we have a link to a code example of accumulating floating point relative motion</a:t>
+            </a:r>
+          </a:p>
+          <a:p>
+            <a:endParaRPr lang="en-US" dirty="0"/>
           </a:p>
         </p:txBody>
       </p:sp>
     </p:spTree>
     <p:extLst>
       <p:ext uri="{BB962C8B-B14F-4D97-AF65-F5344CB8AC3E}">
-        <p14:creationId xmlns:p14="http://schemas.microsoft.com/office/powerpoint/2010/main" val="1009389639"/>
+        <p14:creationId xmlns:p14="http://schemas.microsoft.com/office/powerpoint/2010/main" val="3332013481"/>
       </p:ext>
     </p:extLst>
   </p:cSld>
@@ -3178,35 +3503,38 @@
           <a:p>
             <a:r>
               <a:rPr lang="en-US" dirty="0"/>
-              <a:t> Simplifying and streamlining the build process</a:t>
-            </a:r>
-          </a:p>
-          <a:p>
-            <a:pPr lvl="1"/>
-            <a:r>
-              <a:rPr lang="en-US" dirty="0"/>
-              <a:t>Standardizing on </a:t>
-            </a:r>
-            <a:r>
-              <a:rPr lang="en-US" dirty="0" err="1"/>
-              <a:t>Cmake</a:t>
-            </a:r>
+              <a:t> Opportunity to apply what we’ve learned over the last 10 years, changing the API and ABI</a:t>
+            </a:r>
+          </a:p>
+          <a:p>
+            <a:r>
+              <a:rPr lang="en-US" dirty="0"/>
+              <a:t> Simplify and streamline the build process</a:t>
+            </a:r>
+          </a:p>
+          <a:p>
+            <a:r>
+              <a:rPr lang="en-US" dirty="0"/>
+              <a:t> Simplify and streamline the API</a:t>
+            </a:r>
+          </a:p>
+          <a:p>
+            <a:r>
+              <a:rPr lang="en-US" dirty="0"/>
+              <a:t> Add new useful functionality</a:t>
+            </a:r>
+          </a:p>
+          <a:p>
+            <a:pPr>
+              <a:buNone/>
+            </a:pPr>
             <a:endParaRPr lang="en-US" dirty="0"/>
           </a:p>
           <a:p>
-            <a:pPr lvl="1"/>
-            <a:r>
-              <a:rPr lang="en-US" dirty="0"/>
-              <a:t>Visual Studio and </a:t>
-            </a:r>
-            <a:r>
-              <a:rPr lang="en-US" dirty="0" err="1"/>
-              <a:t>Xcode</a:t>
-            </a:r>
-            <a:r>
-              <a:rPr lang="en-US" dirty="0"/>
-              <a:t> projects still available</a:t>
-            </a:r>
+            <a:endParaRPr lang="en-US" dirty="0"/>
+          </a:p>
+          <a:p>
+            <a:endParaRPr lang="en-US" dirty="0"/>
           </a:p>
         </p:txBody>
       </p:sp>
@@ -3361,35 +3689,34 @@
           <a:p>
             <a:r>
               <a:rPr lang="en-US" dirty="0"/>
-              <a:t> Simplifying and streamlining the API</a:t>
+              <a:t> Simplifying and streamlining the build process</a:t>
             </a:r>
           </a:p>
           <a:p>
             <a:pPr lvl="1"/>
             <a:r>
               <a:rPr lang="en-US" dirty="0"/>
-              <a:t>Symbol naming conventions are more consistent</a:t>
-            </a:r>
+              <a:t>Standardizing on </a:t>
+            </a:r>
+            <a:r>
+              <a:rPr lang="en-US" dirty="0" err="1"/>
+              <a:t>Cmake</a:t>
+            </a:r>
+            <a:endParaRPr lang="en-US" dirty="0"/>
           </a:p>
           <a:p>
             <a:pPr lvl="1"/>
             <a:r>
               <a:rPr lang="en-US" dirty="0"/>
-              <a:t>Simplifying functions where it makes sense</a:t>
-            </a:r>
-          </a:p>
-          <a:p>
-            <a:pPr lvl="1"/>
-            <a:r>
-              <a:rPr lang="en-US" dirty="0"/>
-              <a:t>Removing functions where it makes sense</a:t>
-            </a:r>
-          </a:p>
-          <a:p>
-            <a:pPr lvl="1"/>
-            <a:r>
-              <a:rPr lang="en-US" dirty="0"/>
-              <a:t>main() handling moved to a standalone header library</a:t>
+              <a:t>Visual Studio and </a:t>
+            </a:r>
+            <a:r>
+              <a:rPr lang="en-US" dirty="0" err="1"/>
+              <a:t>Xcode</a:t>
+            </a:r>
+            <a:r>
+              <a:rPr lang="en-US" dirty="0"/>
+              <a:t> projects still available</a:t>
             </a:r>
           </a:p>
         </p:txBody>
@@ -3397,7 +3724,7 @@
     </p:spTree>
     <p:extLst>
       <p:ext uri="{BB962C8B-B14F-4D97-AF65-F5344CB8AC3E}">
-        <p14:creationId xmlns:p14="http://schemas.microsoft.com/office/powerpoint/2010/main" val="61309851"/>
+        <p14:creationId xmlns:p14="http://schemas.microsoft.com/office/powerpoint/2010/main" val="2877845163"/>
       </p:ext>
     </p:extLst>
   </p:cSld>
@@ -3545,42 +3872,35 @@
           <a:p>
             <a:r>
               <a:rPr lang="en-US" dirty="0"/>
-              <a:t> Adding new useful functionality</a:t>
+              <a:t> Simplifying and streamlining the API</a:t>
             </a:r>
           </a:p>
           <a:p>
             <a:pPr lvl="1"/>
             <a:r>
               <a:rPr lang="en-US" dirty="0"/>
-              <a:t>New 3D GPU API in development</a:t>
+              <a:t>Symbol naming conventions are more consistent</a:t>
             </a:r>
           </a:p>
           <a:p>
             <a:pPr lvl="1"/>
             <a:r>
               <a:rPr lang="en-US" dirty="0"/>
-              <a:t>Full support for high DPI displays</a:t>
+              <a:t>Simplifying functions where it makes sense</a:t>
             </a:r>
           </a:p>
           <a:p>
             <a:pPr lvl="1"/>
             <a:r>
               <a:rPr lang="en-US" dirty="0"/>
-              <a:t>Added nanosecond time precision</a:t>
+              <a:t>Removing functions where it makes sense</a:t>
             </a:r>
           </a:p>
           <a:p>
             <a:pPr lvl="1"/>
             <a:r>
               <a:rPr lang="en-US" dirty="0"/>
-              <a:t>Added sub-frame event timing</a:t>
-            </a:r>
-          </a:p>
-          <a:p>
-            <a:pPr lvl="1"/>
-            <a:r>
-              <a:rPr lang="en-US" dirty="0"/>
-              <a:t>And much, much more!</a:t>
+              <a:t>main() handling moved to a standalone header library</a:t>
             </a:r>
           </a:p>
         </p:txBody>
@@ -3588,7 +3908,7 @@
     </p:spTree>
     <p:extLst>
       <p:ext uri="{BB962C8B-B14F-4D97-AF65-F5344CB8AC3E}">
-        <p14:creationId xmlns:p14="http://schemas.microsoft.com/office/powerpoint/2010/main" val="400802205"/>
+        <p14:creationId xmlns:p14="http://schemas.microsoft.com/office/powerpoint/2010/main" val="61309851"/>
       </p:ext>
     </p:extLst>
   </p:cSld>
@@ -3650,7 +3970,7 @@
             </a:pPr>
             <a:r>
               <a:rPr lang="en-US"/>
-              <a:t>The Compatibility Story</a:t>
+              <a:t>The Future: SDL 3.0</a:t>
             </a:r>
             <a:endParaRPr/>
           </a:p>
@@ -3677,7 +3997,7 @@
         </p:spPr>
         <p:txBody>
           <a:bodyPr>
-            <a:normAutofit fontScale="85000" lnSpcReduction="20000"/>
+            <a:normAutofit/>
           </a:bodyPr>
           <a:lstStyle>
             <a:lvl1pPr marL="0" indent="0">
@@ -3735,32 +4055,43 @@
           </a:lstStyle>
           <a:p>
             <a:r>
-              <a:rPr lang="en-US"/>
-              <a:t> Compatibility is important so older commercial games continue to run as platforms evolve </a:t>
-            </a:r>
-          </a:p>
-          <a:p>
-            <a:r>
-              <a:rPr lang="en-US"/>
-              <a:t> sdl12-compat allows running SDL 1.2 games on the SDL 2.0 runtime</a:t>
-            </a:r>
-          </a:p>
-          <a:p>
-            <a:r>
-              <a:rPr lang="en-US"/>
-              <a:t> sdl2-compat allows running SDL 2.0 games on the SDL 3.0 runtime</a:t>
-            </a:r>
-          </a:p>
-          <a:p>
-            <a:r>
-              <a:rPr lang="en-US"/>
-              <a:t> SDL 1.2 =&gt; sdl12-compat =&gt; sdl2-compat =&gt; SDL 3.0 works!</a:t>
-            </a:r>
-          </a:p>
-          <a:p>
-            <a:r>
-              <a:rPr lang="en-US"/>
-              <a:t> Civilization: Call To Power from 1999 runs seamlessly on a modern Linux system running Wayland</a:t>
+              <a:rPr lang="en-US" dirty="0"/>
+              <a:t> Adding new useful functionality</a:t>
+            </a:r>
+          </a:p>
+          <a:p>
+            <a:pPr lvl="1"/>
+            <a:r>
+              <a:rPr lang="en-US" dirty="0"/>
+              <a:t>New 3D GPU API in development</a:t>
+            </a:r>
+          </a:p>
+          <a:p>
+            <a:pPr lvl="1"/>
+            <a:r>
+              <a:rPr lang="en-US" dirty="0"/>
+              <a:t>Full support for high DPI displays</a:t>
+            </a:r>
+          </a:p>
+          <a:p>
+            <a:pPr lvl="1"/>
+            <a:r>
+              <a:rPr lang="en-US" dirty="0"/>
+              <a:t>Added nanosecond time precision</a:t>
+            </a:r>
+          </a:p>
+          <a:p>
+            <a:pPr lvl="1"/>
+            <a:r>
+              <a:rPr lang="en-US" dirty="0"/>
+              <a:t>Added sub-frame event timing</a:t>
+            </a:r>
+          </a:p>
+          <a:p>
+            <a:pPr lvl="1"/>
+            <a:r>
+              <a:rPr lang="en-US" dirty="0"/>
+              <a:t>And much, much more!</a:t>
             </a:r>
           </a:p>
         </p:txBody>
@@ -3768,7 +4099,7 @@
     </p:spTree>
     <p:extLst>
       <p:ext uri="{BB962C8B-B14F-4D97-AF65-F5344CB8AC3E}">
-        <p14:creationId xmlns:p14="http://schemas.microsoft.com/office/powerpoint/2010/main" val="1322980550"/>
+        <p14:creationId xmlns:p14="http://schemas.microsoft.com/office/powerpoint/2010/main" val="400802205"/>
       </p:ext>
     </p:extLst>
   </p:cSld>
@@ -3830,7 +4161,7 @@
             </a:pPr>
             <a:r>
               <a:rPr lang="en-US"/>
-              <a:t>Easing the Transition</a:t>
+              <a:t>The Compatibility Story</a:t>
             </a:r>
             <a:endParaRPr/>
           </a:p>
@@ -3857,7 +4188,7 @@
         </p:spPr>
         <p:txBody>
           <a:bodyPr>
-            <a:normAutofit/>
+            <a:normAutofit fontScale="85000" lnSpcReduction="20000"/>
           </a:bodyPr>
           <a:lstStyle>
             <a:lvl1pPr marL="0" indent="0">
@@ -3915,44 +4246,40 @@
           </a:lstStyle>
           <a:p>
             <a:r>
-              <a:rPr lang="en-US" dirty="0"/>
-              <a:t> Careful decisions about how to change the codebase</a:t>
-            </a:r>
-          </a:p>
-          <a:p>
-            <a:pPr lvl="1"/>
-            <a:r>
-              <a:rPr lang="en-US" dirty="0"/>
-              <a:t>Code style reformatting was applied to both SDL2 and SDL3 so bug fixes could be more easily merged between major versions</a:t>
-            </a:r>
-          </a:p>
-          <a:p>
-            <a:pPr lvl="1"/>
-            <a:r>
-              <a:rPr lang="en-US" dirty="0"/>
-              <a:t>We decided not to switch to </a:t>
-            </a:r>
-            <a:r>
-              <a:rPr lang="en-US" dirty="0" err="1"/>
-              <a:t>stdint</a:t>
-            </a:r>
-            <a:r>
-              <a:rPr lang="en-US" dirty="0"/>
-              <a:t> types for internal code</a:t>
-            </a:r>
-          </a:p>
-          <a:p>
-            <a:pPr>
-              <a:buNone/>
-            </a:pPr>
-            <a:endParaRPr lang="en-US" dirty="0"/>
+              <a:rPr lang="en-US"/>
+              <a:t> Compatibility is important so older commercial games continue to run as platforms evolve </a:t>
+            </a:r>
+          </a:p>
+          <a:p>
+            <a:r>
+              <a:rPr lang="en-US"/>
+              <a:t> sdl12-compat allows running SDL 1.2 games on the SDL 2.0 runtime</a:t>
+            </a:r>
+          </a:p>
+          <a:p>
+            <a:r>
+              <a:rPr lang="en-US"/>
+              <a:t> sdl2-compat allows running SDL 2.0 games on the SDL 3.0 runtime</a:t>
+            </a:r>
+          </a:p>
+          <a:p>
+            <a:r>
+              <a:rPr lang="en-US"/>
+              <a:t> SDL 1.2 =&gt; sdl12-compat =&gt; sdl2-compat =&gt; SDL 3.0 works!</a:t>
+            </a:r>
+          </a:p>
+          <a:p>
+            <a:r>
+              <a:rPr lang="en-US"/>
+              <a:t> Civilization: Call To Power from 1999 runs seamlessly on a modern Linux system running Wayland</a:t>
+            </a:r>
           </a:p>
         </p:txBody>
       </p:sp>
     </p:spTree>
     <p:extLst>
       <p:ext uri="{BB962C8B-B14F-4D97-AF65-F5344CB8AC3E}">
-        <p14:creationId xmlns:p14="http://schemas.microsoft.com/office/powerpoint/2010/main" val="1925629437"/>
+        <p14:creationId xmlns:p14="http://schemas.microsoft.com/office/powerpoint/2010/main" val="1322980550"/>
       </p:ext>
     </p:extLst>
   </p:cSld>
@@ -4100,29 +4427,43 @@
           <a:p>
             <a:r>
               <a:rPr lang="en-US" dirty="0"/>
-              <a:t> Careful decisions about how to change the API</a:t>
+              <a:t> Careful decisions about how to change the codebase</a:t>
             </a:r>
           </a:p>
           <a:p>
             <a:pPr lvl="1"/>
             <a:r>
               <a:rPr lang="en-US" dirty="0"/>
-              <a:t>Does the change make life better for developers?</a:t>
+              <a:t>Code style reformatting was applied to both SDL2 and SDL3 so bug fixes could be more easily merged between major versions</a:t>
             </a:r>
           </a:p>
           <a:p>
             <a:pPr lvl="1"/>
             <a:r>
               <a:rPr lang="en-US" dirty="0"/>
-              <a:t>Are we changing the API in a way that will still make sense 10 years from now?</a:t>
-            </a:r>
+              <a:t>We decided not to switch to </a:t>
+            </a:r>
+            <a:r>
+              <a:rPr lang="en-US" dirty="0" err="1"/>
+              <a:t>stdint</a:t>
+            </a:r>
+            <a:r>
+              <a:rPr lang="en-US" dirty="0"/>
+              <a:t> types for internal code</a:t>
+            </a:r>
+          </a:p>
+          <a:p>
+            <a:pPr>
+              <a:buNone/>
+            </a:pPr>
+            <a:endParaRPr lang="en-US" dirty="0"/>
           </a:p>
         </p:txBody>
       </p:sp>
     </p:spTree>
     <p:extLst>
       <p:ext uri="{BB962C8B-B14F-4D97-AF65-F5344CB8AC3E}">
-        <p14:creationId xmlns:p14="http://schemas.microsoft.com/office/powerpoint/2010/main" val="3973474921"/>
+        <p14:creationId xmlns:p14="http://schemas.microsoft.com/office/powerpoint/2010/main" val="1925629437"/>
       </p:ext>
     </p:extLst>
   </p:cSld>
@@ -4270,6 +4611,176 @@
           <a:p>
             <a:r>
               <a:rPr lang="en-US" dirty="0"/>
+              <a:t> Careful decisions about how to change the API</a:t>
+            </a:r>
+          </a:p>
+          <a:p>
+            <a:pPr lvl="1"/>
+            <a:r>
+              <a:rPr lang="en-US" dirty="0"/>
+              <a:t>Does the change make life better for developers?</a:t>
+            </a:r>
+          </a:p>
+          <a:p>
+            <a:pPr lvl="1"/>
+            <a:r>
+              <a:rPr lang="en-US" dirty="0"/>
+              <a:t>Are we changing the API in a way that will still make sense 10 years from now?</a:t>
+            </a:r>
+          </a:p>
+        </p:txBody>
+      </p:sp>
+    </p:spTree>
+    <p:extLst>
+      <p:ext uri="{BB962C8B-B14F-4D97-AF65-F5344CB8AC3E}">
+        <p14:creationId xmlns:p14="http://schemas.microsoft.com/office/powerpoint/2010/main" val="3973474921"/>
+      </p:ext>
+    </p:extLst>
+  </p:cSld>
+  <p:clrMapOvr>
+    <a:masterClrMapping/>
+  </p:clrMapOvr>
+  <p:transition spd="med"/>
+</p:sld>
+</file>
+
+<file path=ppt/slides/slide17.xml><?xml version="1.0" encoding="utf-8"?>
+<p:sld xmlns:a="http://schemas.openxmlformats.org/drawingml/2006/main" xmlns:r="http://schemas.openxmlformats.org/officeDocument/2006/relationships" xmlns:p="http://schemas.openxmlformats.org/presentationml/2006/main">
+  <p:cSld>
+    <p:spTree>
+      <p:nvGrpSpPr>
+        <p:cNvPr id="1" name=""/>
+        <p:cNvGrpSpPr/>
+        <p:nvPr/>
+      </p:nvGrpSpPr>
+      <p:grpSpPr>
+        <a:xfrm>
+          <a:off x="0" y="0"/>
+          <a:ext cx="0" cy="0"/>
+          <a:chOff x="0" y="0"/>
+          <a:chExt cx="0" cy="0"/>
+        </a:xfrm>
+      </p:grpSpPr>
+      <p:sp>
+        <p:nvSpPr>
+          <p:cNvPr id="30" name="Title"/>
+          <p:cNvSpPr txBox="1">
+            <a:spLocks noGrp="1"/>
+          </p:cNvSpPr>
+          <p:nvPr>
+            <p:ph type="title" idx="4294967295"/>
+          </p:nvPr>
+        </p:nvSpPr>
+        <p:spPr>
+          <a:xfrm>
+            <a:off x="508000" y="533400"/>
+            <a:ext cx="15392400" cy="1387475"/>
+          </a:xfrm>
+          <a:prstGeom prst="rect">
+            <a:avLst/>
+          </a:prstGeom>
+        </p:spPr>
+        <p:txBody>
+          <a:bodyPr anchor="t">
+            <a:normAutofit/>
+          </a:bodyPr>
+          <a:lstStyle/>
+          <a:p>
+            <a:pPr algn="l">
+              <a:defRPr>
+                <a:solidFill>
+                  <a:srgbClr val="000000"/>
+                </a:solidFill>
+              </a:defRPr>
+            </a:pPr>
+            <a:r>
+              <a:rPr lang="en-US"/>
+              <a:t>Easing the Transition</a:t>
+            </a:r>
+            <a:endParaRPr/>
+          </a:p>
+        </p:txBody>
+      </p:sp>
+      <p:sp>
+        <p:nvSpPr>
+          <p:cNvPr id="31" name="Click to edit Master text styles…"/>
+          <p:cNvSpPr txBox="1">
+            <a:spLocks noGrp="1"/>
+          </p:cNvSpPr>
+          <p:nvPr>
+            <p:ph type="body" idx="4294967295"/>
+          </p:nvPr>
+        </p:nvSpPr>
+        <p:spPr>
+          <a:xfrm>
+            <a:off x="508000" y="2022475"/>
+            <a:ext cx="15392400" cy="5597525"/>
+          </a:xfrm>
+          <a:prstGeom prst="rect">
+            <a:avLst/>
+          </a:prstGeom>
+        </p:spPr>
+        <p:txBody>
+          <a:bodyPr>
+            <a:normAutofit/>
+          </a:bodyPr>
+          <a:lstStyle>
+            <a:lvl1pPr marL="0" indent="0">
+              <a:defRPr>
+                <a:latin typeface="Arial"/>
+                <a:ea typeface="Arial"/>
+                <a:cs typeface="Arial"/>
+                <a:sym typeface="Arial"/>
+              </a:defRPr>
+            </a:lvl1pPr>
+            <a:lvl2pPr marL="957262" indent="-500062">
+              <a:spcBef>
+                <a:spcPts val="0"/>
+              </a:spcBef>
+              <a:defRPr sz="4200">
+                <a:latin typeface="Arial"/>
+                <a:ea typeface="Arial"/>
+                <a:cs typeface="Arial"/>
+                <a:sym typeface="Arial"/>
+              </a:defRPr>
+            </a:lvl2pPr>
+            <a:lvl3pPr>
+              <a:spcBef>
+                <a:spcPts val="0"/>
+              </a:spcBef>
+              <a:defRPr sz="3400">
+                <a:latin typeface="Arial"/>
+                <a:ea typeface="Arial"/>
+                <a:cs typeface="Arial"/>
+                <a:sym typeface="Arial"/>
+              </a:defRPr>
+            </a:lvl3pPr>
+            <a:lvl4pPr>
+              <a:spcBef>
+                <a:spcPts val="0"/>
+              </a:spcBef>
+              <a:defRPr sz="3200">
+                <a:latin typeface="Arial"/>
+                <a:ea typeface="Arial"/>
+                <a:cs typeface="Arial"/>
+                <a:sym typeface="Arial"/>
+              </a:defRPr>
+            </a:lvl4pPr>
+            <a:lvl5pPr>
+              <a:spcBef>
+                <a:spcPts val="0"/>
+              </a:spcBef>
+              <a:defRPr sz="3200">
+                <a:latin typeface="Arial"/>
+                <a:ea typeface="Arial"/>
+                <a:cs typeface="Arial"/>
+                <a:sym typeface="Arial"/>
+              </a:defRPr>
+            </a:lvl5pPr>
+          </a:lstStyle>
+          <a:p>
+            <a:r>
+              <a:rPr lang="en-US" dirty="0"/>
               <a:t> Transition guide</a:t>
             </a:r>
           </a:p>
@@ -4307,7 +4818,7 @@
 </p:sld>
 </file>
 
-<file path=ppt/slides/slide17.xml><?xml version="1.0" encoding="utf-8"?>
+<file path=ppt/slides/slide18.xml><?xml version="1.0" encoding="utf-8"?>
 <p:sld xmlns:a="http://schemas.openxmlformats.org/drawingml/2006/main" xmlns:r="http://schemas.openxmlformats.org/officeDocument/2006/relationships" xmlns:p="http://schemas.openxmlformats.org/presentationml/2006/main">
   <p:cSld>
     <p:bg>
@@ -4390,190 +4901,6 @@
 </p:sld>
 </file>
 
-<file path=ppt/slides/slide18.xml><?xml version="1.0" encoding="utf-8"?>
-<p:sld xmlns:a="http://schemas.openxmlformats.org/drawingml/2006/main" xmlns:r="http://schemas.openxmlformats.org/officeDocument/2006/relationships" xmlns:p="http://schemas.openxmlformats.org/presentationml/2006/main">
-  <p:cSld>
-    <p:spTree>
-      <p:nvGrpSpPr>
-        <p:cNvPr id="1" name=""/>
-        <p:cNvGrpSpPr/>
-        <p:nvPr/>
-      </p:nvGrpSpPr>
-      <p:grpSpPr>
-        <a:xfrm>
-          <a:off x="0" y="0"/>
-          <a:ext cx="0" cy="0"/>
-          <a:chOff x="0" y="0"/>
-          <a:chExt cx="0" cy="0"/>
-        </a:xfrm>
-      </p:grpSpPr>
-      <p:sp>
-        <p:nvSpPr>
-          <p:cNvPr id="30" name="Title"/>
-          <p:cNvSpPr txBox="1">
-            <a:spLocks noGrp="1"/>
-          </p:cNvSpPr>
-          <p:nvPr>
-            <p:ph type="title" idx="4294967295"/>
-          </p:nvPr>
-        </p:nvSpPr>
-        <p:spPr>
-          <a:xfrm>
-            <a:off x="508000" y="533400"/>
-            <a:ext cx="15392400" cy="1387475"/>
-          </a:xfrm>
-          <a:prstGeom prst="rect">
-            <a:avLst/>
-          </a:prstGeom>
-        </p:spPr>
-        <p:txBody>
-          <a:bodyPr anchor="t">
-            <a:normAutofit/>
-          </a:bodyPr>
-          <a:lstStyle/>
-          <a:p>
-            <a:pPr algn="l">
-              <a:defRPr>
-                <a:solidFill>
-                  <a:srgbClr val="000000"/>
-                </a:solidFill>
-              </a:defRPr>
-            </a:pPr>
-            <a:r>
-              <a:rPr lang="en-US" dirty="0"/>
-              <a:t>Topic: Relative Mouse Motion</a:t>
-            </a:r>
-            <a:endParaRPr dirty="0"/>
-          </a:p>
-        </p:txBody>
-      </p:sp>
-      <p:sp>
-        <p:nvSpPr>
-          <p:cNvPr id="31" name="Click to edit Master text styles…"/>
-          <p:cNvSpPr txBox="1">
-            <a:spLocks noGrp="1"/>
-          </p:cNvSpPr>
-          <p:nvPr>
-            <p:ph type="body" idx="4294967295"/>
-          </p:nvPr>
-        </p:nvSpPr>
-        <p:spPr>
-          <a:xfrm>
-            <a:off x="508000" y="2022475"/>
-            <a:ext cx="15392400" cy="5597525"/>
-          </a:xfrm>
-          <a:prstGeom prst="rect">
-            <a:avLst/>
-          </a:prstGeom>
-        </p:spPr>
-        <p:txBody>
-          <a:bodyPr>
-            <a:normAutofit/>
-          </a:bodyPr>
-          <a:lstStyle>
-            <a:lvl1pPr marL="0" indent="0">
-              <a:defRPr>
-                <a:latin typeface="Arial"/>
-                <a:ea typeface="Arial"/>
-                <a:cs typeface="Arial"/>
-                <a:sym typeface="Arial"/>
-              </a:defRPr>
-            </a:lvl1pPr>
-            <a:lvl2pPr marL="957262" indent="-500062">
-              <a:spcBef>
-                <a:spcPts val="0"/>
-              </a:spcBef>
-              <a:defRPr sz="4200">
-                <a:latin typeface="Arial"/>
-                <a:ea typeface="Arial"/>
-                <a:cs typeface="Arial"/>
-                <a:sym typeface="Arial"/>
-              </a:defRPr>
-            </a:lvl2pPr>
-            <a:lvl3pPr>
-              <a:spcBef>
-                <a:spcPts val="0"/>
-              </a:spcBef>
-              <a:defRPr sz="3400">
-                <a:latin typeface="Arial"/>
-                <a:ea typeface="Arial"/>
-                <a:cs typeface="Arial"/>
-                <a:sym typeface="Arial"/>
-              </a:defRPr>
-            </a:lvl3pPr>
-            <a:lvl4pPr>
-              <a:spcBef>
-                <a:spcPts val="0"/>
-              </a:spcBef>
-              <a:defRPr sz="3200">
-                <a:latin typeface="Arial"/>
-                <a:ea typeface="Arial"/>
-                <a:cs typeface="Arial"/>
-                <a:sym typeface="Arial"/>
-              </a:defRPr>
-            </a:lvl4pPr>
-            <a:lvl5pPr>
-              <a:spcBef>
-                <a:spcPts val="0"/>
-              </a:spcBef>
-              <a:defRPr sz="3200">
-                <a:latin typeface="Arial"/>
-                <a:ea typeface="Arial"/>
-                <a:cs typeface="Arial"/>
-                <a:sym typeface="Arial"/>
-              </a:defRPr>
-            </a:lvl5pPr>
-          </a:lstStyle>
-          <a:p>
-            <a:r>
-              <a:rPr lang="en-US" dirty="0"/>
-              <a:t> When is it useful?</a:t>
-            </a:r>
-          </a:p>
-          <a:p>
-            <a:pPr lvl="1"/>
-            <a:r>
-              <a:rPr lang="en-US" dirty="0"/>
-              <a:t>Camera control in FPS style games</a:t>
-            </a:r>
-          </a:p>
-          <a:p>
-            <a:pPr lvl="1"/>
-            <a:r>
-              <a:rPr lang="en-US" dirty="0"/>
-              <a:t>Dragging the map in RTS or RPG style games</a:t>
-            </a:r>
-          </a:p>
-          <a:p>
-            <a:pPr lvl="1"/>
-            <a:r>
-              <a:rPr lang="en-US" dirty="0"/>
-              <a:t>Precise mouse positioning in emulators</a:t>
-            </a:r>
-          </a:p>
-          <a:p>
-            <a:pPr lvl="1"/>
-            <a:r>
-              <a:rPr lang="en-US" dirty="0"/>
-              <a:t>… etc.</a:t>
-            </a:r>
-          </a:p>
-        </p:txBody>
-      </p:sp>
-    </p:spTree>
-    <p:extLst>
-      <p:ext uri="{BB962C8B-B14F-4D97-AF65-F5344CB8AC3E}">
-        <p14:creationId xmlns:p14="http://schemas.microsoft.com/office/powerpoint/2010/main" val="1966992376"/>
-      </p:ext>
-    </p:extLst>
-  </p:cSld>
-  <p:clrMapOvr>
-    <a:masterClrMapping/>
-  </p:clrMapOvr>
-  <p:transition spd="med"/>
-</p:sld>
-</file>
-
 <file path=ppt/slides/slide19.xml><?xml version="1.0" encoding="utf-8"?>
 <p:sld xmlns:a="http://schemas.openxmlformats.org/drawingml/2006/main" xmlns:r="http://schemas.openxmlformats.org/officeDocument/2006/relationships" xmlns:p="http://schemas.openxmlformats.org/presentationml/2006/main">
   <p:cSld>
@@ -4624,10 +4951,10 @@
               </a:defRPr>
             </a:pPr>
             <a:r>
-              <a:rPr lang="en-US"/>
+              <a:rPr lang="en-US" dirty="0"/>
               <a:t>Topic: Relative Mouse Motion</a:t>
             </a:r>
-            <a:endParaRPr/>
+            <a:endParaRPr dirty="0"/>
           </a:p>
         </p:txBody>
       </p:sp>
@@ -4710,36 +5037,36 @@
           </a:lstStyle>
           <a:p>
             <a:r>
-              <a:rPr lang="en-US"/>
-              <a:t> Classic approach:</a:t>
+              <a:rPr lang="en-US" dirty="0"/>
+              <a:t> When is it useful?</a:t>
             </a:r>
           </a:p>
           <a:p>
             <a:pPr lvl="1"/>
             <a:r>
-              <a:rPr lang="en-US"/>
-              <a:t>Mouse warping - originally used in the id DOOM engine</a:t>
+              <a:rPr lang="en-US" dirty="0"/>
+              <a:t>Camera control in FPS style games</a:t>
             </a:r>
           </a:p>
           <a:p>
             <a:pPr lvl="1"/>
             <a:r>
-              <a:rPr lang="en-US"/>
-              <a:t>Generates additional mouse events</a:t>
+              <a:rPr lang="en-US" dirty="0"/>
+              <a:t>Dragging the map in RTS or RPG style games</a:t>
             </a:r>
           </a:p>
           <a:p>
             <a:pPr lvl="1"/>
             <a:r>
-              <a:rPr lang="en-US"/>
-              <a:t>Deltas are affected by desktop mouse acceleration</a:t>
+              <a:rPr lang="en-US" dirty="0"/>
+              <a:t>Precise mouse positioning in emulators</a:t>
             </a:r>
           </a:p>
           <a:p>
             <a:pPr lvl="1"/>
             <a:r>
-              <a:rPr lang="en-US"/>
-              <a:t>Doesn’t work over Windows Remote Desktop</a:t>
+              <a:rPr lang="en-US" dirty="0"/>
+              <a:t>… etc.</a:t>
             </a:r>
           </a:p>
         </p:txBody>
@@ -4747,7 +5074,7 @@
     </p:spTree>
     <p:extLst>
       <p:ext uri="{BB962C8B-B14F-4D97-AF65-F5344CB8AC3E}">
-        <p14:creationId xmlns:p14="http://schemas.microsoft.com/office/powerpoint/2010/main" val="83657671"/>
+        <p14:creationId xmlns:p14="http://schemas.microsoft.com/office/powerpoint/2010/main" val="1966992376"/>
       </p:ext>
     </p:extLst>
   </p:cSld>
@@ -5085,58 +5412,35 @@
           <a:p>
             <a:r>
               <a:rPr lang="en-US" dirty="0"/>
-              <a:t> </a:t>
-            </a:r>
-            <a:r>
-              <a:rPr lang="en-US" dirty="0" err="1"/>
-              <a:t>SDL_SetRelativeMouseMode</a:t>
-            </a:r>
-            <a:r>
-              <a:rPr lang="en-US" dirty="0"/>
-              <a:t>()</a:t>
+              <a:t> Classic approach:</a:t>
             </a:r>
           </a:p>
           <a:p>
             <a:pPr lvl="1"/>
             <a:r>
               <a:rPr lang="en-US" dirty="0"/>
-              <a:t>Automatically hides the mouse cursor</a:t>
+              <a:t>Mouse warping - originally used in the id DOOM engine</a:t>
             </a:r>
           </a:p>
           <a:p>
             <a:pPr lvl="1"/>
             <a:r>
               <a:rPr lang="en-US" dirty="0"/>
-              <a:t>Automatically constrains the mouse to the window</a:t>
+              <a:t>Generates additional mouse events</a:t>
             </a:r>
           </a:p>
           <a:p>
             <a:pPr lvl="1"/>
             <a:r>
               <a:rPr lang="en-US" dirty="0"/>
-              <a:t>Provides low level, low latency mouse deltas</a:t>
+              <a:t>Deltas are affected by desktop mouse acceleration</a:t>
             </a:r>
           </a:p>
           <a:p>
             <a:pPr lvl="1"/>
             <a:r>
               <a:rPr lang="en-US" dirty="0"/>
-              <a:t>Delta scaling disabled by default for predictable movement</a:t>
-            </a:r>
-          </a:p>
-          <a:p>
-            <a:pPr lvl="1"/>
-            <a:r>
-              <a:rPr lang="en-US" dirty="0"/>
-              <a:t>Works with Windows Remote Desktop (</a:t>
-            </a:r>
-            <a:r>
-              <a:rPr lang="en-US" dirty="0" err="1"/>
-              <a:t>sorta</a:t>
-            </a:r>
-            <a:r>
-              <a:rPr lang="en-US" dirty="0"/>
-              <a:t>)</a:t>
+              <a:t>Doesn’t work over Windows Remote Desktop</a:t>
             </a:r>
           </a:p>
         </p:txBody>
@@ -5144,7 +5448,7 @@
     </p:spTree>
     <p:extLst>
       <p:ext uri="{BB962C8B-B14F-4D97-AF65-F5344CB8AC3E}">
-        <p14:creationId xmlns:p14="http://schemas.microsoft.com/office/powerpoint/2010/main" val="3078364881"/>
+        <p14:creationId xmlns:p14="http://schemas.microsoft.com/office/powerpoint/2010/main" val="83657671"/>
       </p:ext>
     </p:extLst>
   </p:cSld>
@@ -5233,7 +5537,7 @@
         </p:spPr>
         <p:txBody>
           <a:bodyPr>
-            <a:normAutofit fontScale="92500" lnSpcReduction="10000"/>
+            <a:normAutofit/>
           </a:bodyPr>
           <a:lstStyle>
             <a:lvl1pPr marL="0" indent="0">
@@ -5291,36 +5595,66 @@
           </a:lstStyle>
           <a:p>
             <a:r>
-              <a:rPr lang="en-US"/>
-              <a:t> Considerations</a:t>
+              <a:rPr lang="en-US" dirty="0"/>
+              <a:t> </a:t>
+            </a:r>
+            <a:r>
+              <a:rPr lang="en-US" dirty="0" err="1"/>
+              <a:t>SDL_SetRelativeMouseMode</a:t>
+            </a:r>
+            <a:r>
+              <a:rPr lang="en-US" dirty="0"/>
+              <a:t>()</a:t>
             </a:r>
           </a:p>
           <a:p>
             <a:pPr lvl="1"/>
             <a:r>
-              <a:rPr lang="en-US"/>
-              <a:t>You can save and restore mouse position when enabling and disabling relative mouse mode</a:t>
+              <a:rPr lang="en-US" dirty="0"/>
+              <a:t>Uses raw input instead of mouse warping</a:t>
             </a:r>
           </a:p>
           <a:p>
             <a:pPr lvl="1"/>
             <a:r>
-              <a:rPr lang="en-US"/>
-              <a:t>Warping the mouse in relative mode does not generate a mouse event, but does change mouse position</a:t>
+              <a:rPr lang="en-US" dirty="0"/>
+              <a:t>Automatically hides the mouse cursor</a:t>
             </a:r>
           </a:p>
           <a:p>
             <a:pPr lvl="1"/>
             <a:r>
-              <a:rPr lang="en-US"/>
-              <a:t>You can change relative motion sensitivity by setting SDL_HINT_MOUSE_RELATIVE_SPEED_SCALE</a:t>
+              <a:rPr lang="en-US" dirty="0"/>
+              <a:t>Automatically constrains the mouse to the window</a:t>
             </a:r>
           </a:p>
           <a:p>
             <a:pPr lvl="1"/>
             <a:r>
-              <a:rPr lang="en-US"/>
-              <a:t>You can enable desktop mouse acceleration curves in relative mode by setting SDL_HINT_MOUSE_RELATIVE_SYSTEM_SCALE</a:t>
+              <a:rPr lang="en-US" dirty="0"/>
+              <a:t>Provides low level, low latency mouse deltas</a:t>
+            </a:r>
+          </a:p>
+          <a:p>
+            <a:pPr lvl="1"/>
+            <a:r>
+              <a:rPr lang="en-US" dirty="0"/>
+              <a:t>Delta scaling disabled by default for predictable movement</a:t>
+            </a:r>
+          </a:p>
+          <a:p>
+            <a:pPr lvl="1"/>
+            <a:r>
+              <a:rPr lang="en-US" dirty="0"/>
+              <a:t>Works with Windows Remote Desktop (</a:t>
+            </a:r>
+            <a:r>
+              <a:rPr lang="en-US" dirty="0" err="1"/>
+              <a:t>sorta</a:t>
+            </a:r>
+            <a:r>
+              <a:rPr lang="en-US" dirty="0"/>
+              <a:t>)</a:t>
             </a:r>
           </a:p>
         </p:txBody>
@@ -5328,7 +5662,7 @@
     </p:spTree>
     <p:extLst>
       <p:ext uri="{BB962C8B-B14F-4D97-AF65-F5344CB8AC3E}">
-        <p14:creationId xmlns:p14="http://schemas.microsoft.com/office/powerpoint/2010/main" val="1954144534"/>
+        <p14:creationId xmlns:p14="http://schemas.microsoft.com/office/powerpoint/2010/main" val="3340936182"/>
       </p:ext>
     </p:extLst>
   </p:cSld>
@@ -5340,7 +5674,7 @@
 </file>
 
 <file path=ppt/slides/slide22.xml><?xml version="1.0" encoding="utf-8"?>
-<p:sld xmlns:a="http://schemas.openxmlformats.org/drawingml/2006/main" xmlns:r="http://schemas.openxmlformats.org/officeDocument/2006/relationships" xmlns:p="http://schemas.openxmlformats.org/presentationml/2006/main" show="0">
+<p:sld xmlns:a="http://schemas.openxmlformats.org/drawingml/2006/main" xmlns:r="http://schemas.openxmlformats.org/officeDocument/2006/relationships" xmlns:p="http://schemas.openxmlformats.org/presentationml/2006/main">
   <p:cSld>
     <p:spTree>
       <p:nvGrpSpPr>
@@ -5417,7 +5751,7 @@
         </p:spPr>
         <p:txBody>
           <a:bodyPr>
-            <a:normAutofit/>
+            <a:normAutofit fontScale="92500" lnSpcReduction="10000"/>
           </a:bodyPr>
           <a:lstStyle>
             <a:lvl1pPr marL="0" indent="0">
@@ -5476,58 +5810,43 @@
           <a:p>
             <a:r>
               <a:rPr lang="en-US" dirty="0"/>
-              <a:t> Code example, accumulating floating point relative mouse motion</a:t>
+              <a:t> Considerations</a:t>
             </a:r>
           </a:p>
           <a:p>
             <a:pPr lvl="1"/>
-            <a:endParaRPr lang="en-US" dirty="0"/>
+            <a:r>
+              <a:rPr lang="en-US" dirty="0"/>
+              <a:t>Warping the mouse in relative mode does not generate a mouse event, but does change mouse position</a:t>
+            </a:r>
+          </a:p>
+          <a:p>
+            <a:pPr lvl="1"/>
+            <a:r>
+              <a:rPr lang="en-US" dirty="0"/>
+              <a:t>You can save and restore mouse position when enabling and disabling relative mouse mode</a:t>
+            </a:r>
+          </a:p>
+          <a:p>
+            <a:pPr lvl="1"/>
+            <a:r>
+              <a:rPr lang="en-US" dirty="0"/>
+              <a:t>You can change relative motion sensitivity by setting SDL_HINT_MOUSE_RELATIVE_SPEED_SCALE</a:t>
+            </a:r>
+          </a:p>
+          <a:p>
+            <a:pPr lvl="1"/>
+            <a:r>
+              <a:rPr lang="en-US" dirty="0"/>
+              <a:t>You can enable desktop mouse acceleration curves in relative mode by setting SDL_HINT_MOUSE_RELATIVE_SYSTEM_SCALE</a:t>
+            </a:r>
           </a:p>
         </p:txBody>
       </p:sp>
-      <p:pic>
-        <p:nvPicPr>
-          <p:cNvPr id="5" name="Graphic 4">
-            <a:extLst>
-              <a:ext uri="{FF2B5EF4-FFF2-40B4-BE49-F238E27FC236}">
-                <a16:creationId xmlns:a16="http://schemas.microsoft.com/office/drawing/2014/main" id="{1CEACFE9-0076-4888-973B-94A59E355B52}"/>
-              </a:ext>
-            </a:extLst>
-          </p:cNvPr>
-          <p:cNvPicPr>
-            <a:picLocks noChangeAspect="1"/>
-          </p:cNvPicPr>
-          <p:nvPr/>
-        </p:nvPicPr>
-        <p:blipFill>
-          <a:blip r:embed="rId3" cstate="print">
-            <a:extLst>
-              <a:ext uri="{28A0092B-C50C-407E-A947-70E740481C1C}">
-                <a14:useLocalDpi xmlns:a14="http://schemas.microsoft.com/office/drawing/2010/main" val="0"/>
-              </a:ext>
-              <a:ext uri="{96DAC541-7B7A-43D3-8B79-37D633B846F1}">
-                <asvg:svgBlip xmlns:asvg="http://schemas.microsoft.com/office/drawing/2016/SVG/main" r:embed="rId4"/>
-              </a:ext>
-            </a:extLst>
-          </a:blip>
-          <a:stretch>
-            <a:fillRect/>
-          </a:stretch>
-        </p:blipFill>
-        <p:spPr>
-          <a:xfrm>
-            <a:off x="5918200" y="3625850"/>
-            <a:ext cx="4572000" cy="4572000"/>
-          </a:xfrm>
-          <a:prstGeom prst="rect">
-            <a:avLst/>
-          </a:prstGeom>
-        </p:spPr>
-      </p:pic>
     </p:spTree>
     <p:extLst>
       <p:ext uri="{BB962C8B-B14F-4D97-AF65-F5344CB8AC3E}">
-        <p14:creationId xmlns:p14="http://schemas.microsoft.com/office/powerpoint/2010/main" val="2357737337"/>
+        <p14:creationId xmlns:p14="http://schemas.microsoft.com/office/powerpoint/2010/main" val="1954144534"/>
       </p:ext>
     </p:extLst>
   </p:cSld>
@@ -5672,6 +5991,12 @@
               </a:defRPr>
             </a:lvl5pPr>
           </a:lstStyle>
+          <a:p>
+            <a:r>
+              <a:rPr lang="en-US" dirty="0"/>
+              <a:t> Don’t use mouse warping!</a:t>
+            </a:r>
+          </a:p>
           <a:p>
             <a:r>
               <a:rPr lang="en-US" dirty="0"/>
@@ -5929,53 +6254,25 @@
             <a:pPr lvl="1"/>
             <a:r>
               <a:rPr lang="en-US" dirty="0"/>
-              <a:t>A 4K display with 200% scaling has 1080p screen coordinate size</a:t>
-            </a:r>
-          </a:p>
-          <a:p>
-            <a:endParaRPr lang="en-US" dirty="0"/>
+              <a:t>Screen coordinates, also known as points or device independent pixels, are the size in pixels divided by the display scaling factor</a:t>
+            </a:r>
+          </a:p>
+          <a:p>
+            <a:pPr lvl="1"/>
+            <a:r>
+              <a:rPr lang="en-US" dirty="0"/>
+              <a:t>Screen coordinates are oriented around content physical size</a:t>
+            </a:r>
+          </a:p>
+          <a:p>
+            <a:pPr lvl="1"/>
+            <a:r>
+              <a:rPr lang="en-US" dirty="0"/>
+              <a:t>More pixels means more detail, but not more content</a:t>
+            </a:r>
           </a:p>
         </p:txBody>
       </p:sp>
-      <p:pic>
-        <p:nvPicPr>
-          <p:cNvPr id="5" name="Graphic 4">
-            <a:extLst>
-              <a:ext uri="{FF2B5EF4-FFF2-40B4-BE49-F238E27FC236}">
-                <a16:creationId xmlns:a16="http://schemas.microsoft.com/office/drawing/2014/main" id="{F25802CB-DD0E-4C23-960F-E750DC610722}"/>
-              </a:ext>
-            </a:extLst>
-          </p:cNvPr>
-          <p:cNvPicPr>
-            <a:picLocks noChangeAspect="1"/>
-          </p:cNvPicPr>
-          <p:nvPr/>
-        </p:nvPicPr>
-        <p:blipFill>
-          <a:blip r:embed="rId3">
-            <a:extLst>
-              <a:ext uri="{28A0092B-C50C-407E-A947-70E740481C1C}">
-                <a14:useLocalDpi xmlns:a14="http://schemas.microsoft.com/office/drawing/2010/main" val="0"/>
-              </a:ext>
-              <a:ext uri="{96DAC541-7B7A-43D3-8B79-37D633B846F1}">
-                <asvg:svgBlip xmlns:asvg="http://schemas.microsoft.com/office/drawing/2016/SVG/main" r:embed="rId4"/>
-              </a:ext>
-            </a:extLst>
-          </a:blip>
-          <a:stretch>
-            <a:fillRect/>
-          </a:stretch>
-        </p:blipFill>
-        <p:spPr>
-          <a:xfrm>
-            <a:off x="5029285" y="3993264"/>
-            <a:ext cx="6349830" cy="4971121"/>
-          </a:xfrm>
-          <a:prstGeom prst="rect">
-            <a:avLst/>
-          </a:prstGeom>
-        </p:spPr>
-      </p:pic>
     </p:spTree>
     <p:extLst>
       <p:ext uri="{BB962C8B-B14F-4D97-AF65-F5344CB8AC3E}">
@@ -6127,21 +6424,96 @@
           <a:p>
             <a:r>
               <a:rPr lang="en-US" dirty="0"/>
-              <a:t> Apple platforms provide screen coordinates, optionally allows high DPI back buffers</a:t>
-            </a:r>
-          </a:p>
-          <a:p>
-            <a:r>
-              <a:rPr lang="en-US" dirty="0"/>
-              <a:t> Windows provides screen coordinates for non-DPI aware applications, pixels for DPI aware applications</a:t>
-            </a:r>
+              <a:t> A 4K display with 200% scaling has 1080p screen coordinate size</a:t>
+            </a:r>
+          </a:p>
+          <a:p>
+            <a:endParaRPr lang="en-US" dirty="0"/>
           </a:p>
         </p:txBody>
       </p:sp>
+      <p:pic>
+        <p:nvPicPr>
+          <p:cNvPr id="5" name="Graphic 4">
+            <a:extLst>
+              <a:ext uri="{FF2B5EF4-FFF2-40B4-BE49-F238E27FC236}">
+                <a16:creationId xmlns:a16="http://schemas.microsoft.com/office/drawing/2014/main" id="{F25802CB-DD0E-4C23-960F-E750DC610722}"/>
+              </a:ext>
+            </a:extLst>
+          </p:cNvPr>
+          <p:cNvPicPr>
+            <a:picLocks noChangeAspect="1"/>
+          </p:cNvPicPr>
+          <p:nvPr/>
+        </p:nvPicPr>
+        <p:blipFill>
+          <a:blip r:embed="rId3">
+            <a:extLst>
+              <a:ext uri="{28A0092B-C50C-407E-A947-70E740481C1C}">
+                <a14:useLocalDpi xmlns:a14="http://schemas.microsoft.com/office/drawing/2010/main" val="0"/>
+              </a:ext>
+              <a:ext uri="{96DAC541-7B7A-43D3-8B79-37D633B846F1}">
+                <asvg:svgBlip xmlns:asvg="http://schemas.microsoft.com/office/drawing/2016/SVG/main" r:embed="rId4"/>
+              </a:ext>
+            </a:extLst>
+          </a:blip>
+          <a:stretch>
+            <a:fillRect/>
+          </a:stretch>
+        </p:blipFill>
+        <p:spPr>
+          <a:xfrm>
+            <a:off x="8477318" y="3780532"/>
+            <a:ext cx="7008018" cy="5486400"/>
+          </a:xfrm>
+          <a:prstGeom prst="rect">
+            <a:avLst/>
+          </a:prstGeom>
+        </p:spPr>
+      </p:pic>
+      <p:pic>
+        <p:nvPicPr>
+          <p:cNvPr id="3" name="Graphic 2">
+            <a:extLst>
+              <a:ext uri="{FF2B5EF4-FFF2-40B4-BE49-F238E27FC236}">
+                <a16:creationId xmlns:a16="http://schemas.microsoft.com/office/drawing/2014/main" id="{031713D0-D39E-4B2C-99CB-5F2500CBAC28}"/>
+              </a:ext>
+            </a:extLst>
+          </p:cNvPr>
+          <p:cNvPicPr>
+            <a:picLocks noChangeAspect="1"/>
+          </p:cNvPicPr>
+          <p:nvPr/>
+        </p:nvPicPr>
+        <p:blipFill>
+          <a:blip r:embed="rId5">
+            <a:extLst>
+              <a:ext uri="{28A0092B-C50C-407E-A947-70E740481C1C}">
+                <a14:useLocalDpi xmlns:a14="http://schemas.microsoft.com/office/drawing/2010/main" val="0"/>
+              </a:ext>
+              <a:ext uri="{96DAC541-7B7A-43D3-8B79-37D633B846F1}">
+                <asvg:svgBlip xmlns:asvg="http://schemas.microsoft.com/office/drawing/2016/SVG/main" r:embed="rId6"/>
+              </a:ext>
+            </a:extLst>
+          </a:blip>
+          <a:stretch>
+            <a:fillRect/>
+          </a:stretch>
+        </p:blipFill>
+        <p:spPr>
+          <a:xfrm>
+            <a:off x="1056021" y="3780532"/>
+            <a:ext cx="7008019" cy="5486400"/>
+          </a:xfrm>
+          <a:prstGeom prst="rect">
+            <a:avLst/>
+          </a:prstGeom>
+        </p:spPr>
+      </p:pic>
     </p:spTree>
     <p:extLst>
       <p:ext uri="{BB962C8B-B14F-4D97-AF65-F5344CB8AC3E}">
-        <p14:creationId xmlns:p14="http://schemas.microsoft.com/office/powerpoint/2010/main" val="892474160"/>
+        <p14:creationId xmlns:p14="http://schemas.microsoft.com/office/powerpoint/2010/main" val="713478194"/>
       </p:ext>
     </p:extLst>
   </p:cSld>
@@ -6230,7 +6602,7 @@
         </p:spPr>
         <p:txBody>
           <a:bodyPr lIns="81279" tIns="81279" rIns="81279" bIns="81279" anchor="t">
-            <a:normAutofit lnSpcReduction="10000"/>
+            <a:normAutofit/>
           </a:bodyPr>
           <a:lstStyle>
             <a:lvl1pPr marL="0" indent="0">
@@ -6289,25 +6661,13 @@
           <a:p>
             <a:r>
               <a:rPr lang="en-US" dirty="0"/>
-              <a:t> SDL 3.0 applications always get screen coordinates and high DPI back buffers</a:t>
-            </a:r>
-          </a:p>
-          <a:p>
-            <a:r>
-              <a:rPr lang="en-US" dirty="0"/>
-              <a:t> Display bounds, window coordinates, and mouse coordinates are all specified in screen coordinates</a:t>
-            </a:r>
-          </a:p>
-          <a:p>
-            <a:r>
-              <a:rPr lang="en-US" dirty="0"/>
-              <a:t> Display modes include size in screen coordinates, size in pixels, and a display scale</a:t>
-            </a:r>
-          </a:p>
-          <a:p>
-            <a:r>
-              <a:rPr lang="en-US" dirty="0"/>
-              <a:t> Mouse coordinates are floating point</a:t>
+              <a:t> Apple platforms provide screen coordinates, optionally allows high DPI back buffers</a:t>
+            </a:r>
+          </a:p>
+          <a:p>
+            <a:r>
+              <a:rPr lang="en-US" dirty="0"/>
+              <a:t> Windows provides screen coordinates for non-DPI aware applications, pixels for DPI aware applications</a:t>
             </a:r>
           </a:p>
         </p:txBody>
@@ -6315,7 +6675,7 @@
     </p:spTree>
     <p:extLst>
       <p:ext uri="{BB962C8B-B14F-4D97-AF65-F5344CB8AC3E}">
-        <p14:creationId xmlns:p14="http://schemas.microsoft.com/office/powerpoint/2010/main" val="1958949601"/>
+        <p14:creationId xmlns:p14="http://schemas.microsoft.com/office/powerpoint/2010/main" val="892474160"/>
       </p:ext>
     </p:extLst>
   </p:cSld>
@@ -6376,10 +6736,10 @@
               </a:defRPr>
             </a:pPr>
             <a:r>
-              <a:rPr lang="en-US"/>
+              <a:rPr lang="en-US" dirty="0"/>
               <a:t>Topic: High DPI Support</a:t>
             </a:r>
-            <a:endParaRPr/>
+            <a:endParaRPr dirty="0"/>
           </a:p>
         </p:txBody>
       </p:sp>
@@ -6403,8 +6763,8 @@
           </a:prstGeom>
         </p:spPr>
         <p:txBody>
-          <a:bodyPr>
-            <a:normAutofit/>
+          <a:bodyPr lIns="81279" tIns="81279" rIns="81279" bIns="81279" anchor="t">
+            <a:normAutofit fontScale="92500" lnSpcReduction="10000"/>
           </a:bodyPr>
           <a:lstStyle>
             <a:lvl1pPr marL="0" indent="0">
@@ -6463,29 +6823,25 @@
           <a:p>
             <a:r>
               <a:rPr lang="en-US" dirty="0"/>
-              <a:t> </a:t>
-            </a:r>
-            <a:r>
-              <a:rPr lang="en-US" dirty="0" err="1"/>
-              <a:t>SDL_GetDesktopDisplayMode</a:t>
-            </a:r>
-            <a:r>
-              <a:rPr lang="en-US" dirty="0"/>
-              <a:t>() returns the current desktop mode, including scale</a:t>
-            </a:r>
-          </a:p>
-          <a:p>
-            <a:r>
-              <a:rPr lang="en-US" dirty="0"/>
-              <a:t> </a:t>
-            </a:r>
-            <a:r>
-              <a:rPr lang="en-US" dirty="0" err="1"/>
-              <a:t>SDL_GetWindowSizeInPixels</a:t>
-            </a:r>
-            <a:r>
-              <a:rPr lang="en-US" dirty="0"/>
-              <a:t>() returns the size of the back buffer for a window</a:t>
+              <a:t> SDL 3.0 applications always get screen coordinates and high DPI back buffers</a:t>
+            </a:r>
+          </a:p>
+          <a:p>
+            <a:r>
+              <a:rPr lang="en-US" dirty="0"/>
+              <a:t> Display bounds, window coordinates, and mouse coordinates are all specified in screen coordinates</a:t>
+            </a:r>
+          </a:p>
+          <a:p>
+            <a:r>
+              <a:rPr lang="en-US" dirty="0"/>
+              <a:t> Mouse coordinates are floating point with full precision, centered on pixels</a:t>
+            </a:r>
+          </a:p>
+          <a:p>
+            <a:r>
+              <a:rPr lang="en-US" dirty="0"/>
+              <a:t> Display modes include size in screen coordinates, size in pixels, and a display scale</a:t>
             </a:r>
           </a:p>
         </p:txBody>
@@ -6493,7 +6849,7 @@
     </p:spTree>
     <p:extLst>
       <p:ext uri="{BB962C8B-B14F-4D97-AF65-F5344CB8AC3E}">
-        <p14:creationId xmlns:p14="http://schemas.microsoft.com/office/powerpoint/2010/main" val="288397529"/>
+        <p14:creationId xmlns:p14="http://schemas.microsoft.com/office/powerpoint/2010/main" val="1958949601"/>
       </p:ext>
     </p:extLst>
   </p:cSld>
@@ -6554,10 +6910,10 @@
               </a:defRPr>
             </a:pPr>
             <a:r>
-              <a:rPr lang="en-US"/>
+              <a:rPr lang="en-US" dirty="0"/>
               <a:t>Topic: High DPI Support</a:t>
             </a:r>
-            <a:endParaRPr/>
+            <a:endParaRPr dirty="0"/>
           </a:p>
         </p:txBody>
       </p:sp>
@@ -6581,8 +6937,8 @@
           </a:prstGeom>
         </p:spPr>
         <p:txBody>
-          <a:bodyPr>
-            <a:normAutofit fontScale="92500"/>
+          <a:bodyPr lIns="81279" tIns="81279" rIns="81279" bIns="81279" anchor="t">
+            <a:normAutofit/>
           </a:bodyPr>
           <a:lstStyle>
             <a:lvl1pPr marL="0" indent="0">
@@ -6641,56 +6997,104 @@
           <a:p>
             <a:r>
               <a:rPr lang="en-US" dirty="0"/>
-              <a:t> SDL 2D Render API has convenience functions:</a:t>
-            </a:r>
-          </a:p>
-          <a:p>
-            <a:pPr lvl="1"/>
+              <a:t> A </a:t>
+            </a:r>
             <a:r>
               <a:rPr lang="en-US" dirty="0" err="1"/>
-              <a:t>SDL_SetRenderLogicalPresentation</a:t>
-            </a:r>
-            <a:r>
-              <a:rPr lang="en-US" dirty="0"/>
-              <a:t>() sets a logical size for the content, rendering to an offscreen texture and then scaling it as needed for presentation</a:t>
-            </a:r>
-          </a:p>
-          <a:p>
-            <a:pPr lvl="1"/>
-            <a:r>
-              <a:rPr lang="en-US" dirty="0" err="1"/>
-              <a:t>SDL_RenderCoordinatesToWindow</a:t>
-            </a:r>
-            <a:r>
-              <a:rPr lang="en-US" dirty="0"/>
-              <a:t>() and </a:t>
-            </a:r>
-            <a:r>
-              <a:rPr lang="en-US" dirty="0" err="1"/>
-              <a:t>SDL_RenderCoordinatesFromWindow</a:t>
-            </a:r>
-            <a:r>
-              <a:rPr lang="en-US" dirty="0"/>
-              <a:t>() convert between screen coordinates and coordinates in the render viewport</a:t>
-            </a:r>
-          </a:p>
-          <a:p>
-            <a:pPr lvl="1"/>
-            <a:r>
-              <a:rPr lang="en-US" dirty="0" err="1"/>
-              <a:t>SDL_ConvertEventToRenderCoordinates</a:t>
-            </a:r>
-            <a:r>
-              <a:rPr lang="en-US" dirty="0"/>
-              <a:t>() will convert all coordinates in an event into coordinates in the render viewport</a:t>
-            </a:r>
+              <a:t>fullscreen</a:t>
+            </a:r>
+            <a:r>
+              <a:rPr lang="en-US" dirty="0"/>
+              <a:t> desktop window is 1920x1080 in both cases, and a 4K back buffer on the 4K monitor</a:t>
+            </a:r>
+          </a:p>
+          <a:p>
+            <a:endParaRPr lang="en-US" dirty="0"/>
           </a:p>
         </p:txBody>
       </p:sp>
+      <p:pic>
+        <p:nvPicPr>
+          <p:cNvPr id="5" name="Graphic 4">
+            <a:extLst>
+              <a:ext uri="{FF2B5EF4-FFF2-40B4-BE49-F238E27FC236}">
+                <a16:creationId xmlns:a16="http://schemas.microsoft.com/office/drawing/2014/main" id="{F25802CB-DD0E-4C23-960F-E750DC610722}"/>
+              </a:ext>
+            </a:extLst>
+          </p:cNvPr>
+          <p:cNvPicPr>
+            <a:picLocks noChangeAspect="1"/>
+          </p:cNvPicPr>
+          <p:nvPr/>
+        </p:nvPicPr>
+        <p:blipFill>
+          <a:blip r:embed="rId3">
+            <a:extLst>
+              <a:ext uri="{28A0092B-C50C-407E-A947-70E740481C1C}">
+                <a14:useLocalDpi xmlns:a14="http://schemas.microsoft.com/office/drawing/2010/main" val="0"/>
+              </a:ext>
+              <a:ext uri="{96DAC541-7B7A-43D3-8B79-37D633B846F1}">
+                <asvg:svgBlip xmlns:asvg="http://schemas.microsoft.com/office/drawing/2016/SVG/main" r:embed="rId4"/>
+              </a:ext>
+            </a:extLst>
+          </a:blip>
+          <a:stretch>
+            <a:fillRect/>
+          </a:stretch>
+        </p:blipFill>
+        <p:spPr>
+          <a:xfrm>
+            <a:off x="8477318" y="3780532"/>
+            <a:ext cx="7008018" cy="5486400"/>
+          </a:xfrm>
+          <a:prstGeom prst="rect">
+            <a:avLst/>
+          </a:prstGeom>
+        </p:spPr>
+      </p:pic>
+      <p:pic>
+        <p:nvPicPr>
+          <p:cNvPr id="3" name="Graphic 2">
+            <a:extLst>
+              <a:ext uri="{FF2B5EF4-FFF2-40B4-BE49-F238E27FC236}">
+                <a16:creationId xmlns:a16="http://schemas.microsoft.com/office/drawing/2014/main" id="{031713D0-D39E-4B2C-99CB-5F2500CBAC28}"/>
+              </a:ext>
+            </a:extLst>
+          </p:cNvPr>
+          <p:cNvPicPr>
+            <a:picLocks noChangeAspect="1"/>
+          </p:cNvPicPr>
+          <p:nvPr/>
+        </p:nvPicPr>
+        <p:blipFill>
+          <a:blip r:embed="rId5">
+            <a:extLst>
+              <a:ext uri="{28A0092B-C50C-407E-A947-70E740481C1C}">
+                <a14:useLocalDpi xmlns:a14="http://schemas.microsoft.com/office/drawing/2010/main" val="0"/>
+              </a:ext>
+              <a:ext uri="{96DAC541-7B7A-43D3-8B79-37D633B846F1}">
+                <asvg:svgBlip xmlns:asvg="http://schemas.microsoft.com/office/drawing/2016/SVG/main" r:embed="rId6"/>
+              </a:ext>
+            </a:extLst>
+          </a:blip>
+          <a:stretch>
+            <a:fillRect/>
+          </a:stretch>
+        </p:blipFill>
+        <p:spPr>
+          <a:xfrm>
+            <a:off x="1056021" y="3780532"/>
+            <a:ext cx="7008019" cy="5486400"/>
+          </a:xfrm>
+          <a:prstGeom prst="rect">
+            <a:avLst/>
+          </a:prstGeom>
+        </p:spPr>
+      </p:pic>
     </p:spTree>
     <p:extLst>
       <p:ext uri="{BB962C8B-B14F-4D97-AF65-F5344CB8AC3E}">
-        <p14:creationId xmlns:p14="http://schemas.microsoft.com/office/powerpoint/2010/main" val="1128643442"/>
+        <p14:creationId xmlns:p14="http://schemas.microsoft.com/office/powerpoint/2010/main" val="3114261330"/>
       </p:ext>
     </p:extLst>
   </p:cSld>
@@ -7004,7 +7408,7 @@
         </p:spPr>
         <p:txBody>
           <a:bodyPr>
-            <a:normAutofit fontScale="92500"/>
+            <a:normAutofit/>
           </a:bodyPr>
           <a:lstStyle>
             <a:lvl1pPr marL="0" indent="0">
@@ -7062,37 +7466,30 @@
           </a:lstStyle>
           <a:p>
             <a:r>
-              <a:rPr lang="en-US"/>
-              <a:t> High DPI events:</a:t>
-            </a:r>
-          </a:p>
-          <a:p>
-            <a:pPr lvl="1"/>
-            <a:r>
-              <a:rPr lang="en-US"/>
-              <a:t>SDL_EVENT_WINDOW_RESIZED is sent when a window is resized in screen coordinates</a:t>
-            </a:r>
-          </a:p>
-          <a:p>
-            <a:pPr lvl="1"/>
-            <a:r>
-              <a:rPr lang="en-US"/>
-              <a:t>SDL_EVENT_WINDOW_PIXEL_SIZE_CHANGED is sent when the size of a window’s </a:t>
-            </a:r>
-            <a:r>
-              <a:rPr lang="en-US" err="1"/>
-              <a:t>backbuffer</a:t>
-            </a:r>
-            <a:r>
-              <a:rPr lang="en-US"/>
-              <a:t> has changed, which can happen when moving between high and low density displays</a:t>
-            </a:r>
-          </a:p>
-          <a:p>
-            <a:pPr lvl="1"/>
-            <a:r>
-              <a:rPr lang="en-US"/>
-              <a:t>SDL_EVENT_DISPLAY_SCALE_CHANGED is sent when a display changes scale, which also triggers window pixel size events</a:t>
+              <a:rPr lang="en-US" dirty="0"/>
+              <a:t> </a:t>
+            </a:r>
+            <a:r>
+              <a:rPr lang="en-US" dirty="0" err="1"/>
+              <a:t>SDL_GetDesktopDisplayMode</a:t>
+            </a:r>
+            <a:r>
+              <a:rPr lang="en-US" dirty="0"/>
+              <a:t>() returns the current desktop mode, including scale</a:t>
+            </a:r>
+          </a:p>
+          <a:p>
+            <a:r>
+              <a:rPr lang="en-US" dirty="0"/>
+              <a:t> </a:t>
+            </a:r>
+            <a:r>
+              <a:rPr lang="en-US" dirty="0" err="1"/>
+              <a:t>SDL_GetWindowSizeInPixels</a:t>
+            </a:r>
+            <a:r>
+              <a:rPr lang="en-US" dirty="0"/>
+              <a:t>() returns the size of the back buffer for a window</a:t>
             </a:r>
           </a:p>
         </p:txBody>
@@ -7100,7 +7497,7 @@
     </p:spTree>
     <p:extLst>
       <p:ext uri="{BB962C8B-B14F-4D97-AF65-F5344CB8AC3E}">
-        <p14:creationId xmlns:p14="http://schemas.microsoft.com/office/powerpoint/2010/main" val="3390475410"/>
+        <p14:creationId xmlns:p14="http://schemas.microsoft.com/office/powerpoint/2010/main" val="288397529"/>
       </p:ext>
     </p:extLst>
   </p:cSld>
@@ -7112,7 +7509,7 @@
 </file>
 
 <file path=ppt/slides/slide31.xml><?xml version="1.0" encoding="utf-8"?>
-<p:sld xmlns:a="http://schemas.openxmlformats.org/drawingml/2006/main" xmlns:r="http://schemas.openxmlformats.org/officeDocument/2006/relationships" xmlns:p="http://schemas.openxmlformats.org/presentationml/2006/main" show="0">
+<p:sld xmlns:a="http://schemas.openxmlformats.org/drawingml/2006/main" xmlns:r="http://schemas.openxmlformats.org/officeDocument/2006/relationships" xmlns:p="http://schemas.openxmlformats.org/presentationml/2006/main">
   <p:cSld>
     <p:spTree>
       <p:nvGrpSpPr>
@@ -7189,7 +7586,7 @@
         </p:spPr>
         <p:txBody>
           <a:bodyPr>
-            <a:normAutofit/>
+            <a:normAutofit fontScale="92500"/>
           </a:bodyPr>
           <a:lstStyle>
             <a:lvl1pPr marL="0" indent="0">
@@ -7248,63 +7645,56 @@
           <a:p>
             <a:r>
               <a:rPr lang="en-US" dirty="0"/>
-              <a:t> Code example, getting the desktop scale as a UI scaling factor</a:t>
-            </a:r>
-          </a:p>
-          <a:p>
-            <a:pPr>
-              <a:buNone/>
-            </a:pPr>
-            <a:endParaRPr lang="en-US" sz="1900" b="1" dirty="0">
-              <a:latin typeface="Courier New" panose="02070309020205020404" pitchFamily="49" charset="0"/>
-              <a:cs typeface="Courier New" panose="02070309020205020404" pitchFamily="49" charset="0"/>
-            </a:endParaRPr>
+              <a:t> SDL 2D Render API has convenience functions:</a:t>
+            </a:r>
+          </a:p>
+          <a:p>
+            <a:pPr lvl="1"/>
+            <a:r>
+              <a:rPr lang="en-US" dirty="0" err="1"/>
+              <a:t>SDL_SetRenderLogicalPresentation</a:t>
+            </a:r>
+            <a:r>
+              <a:rPr lang="en-US" dirty="0"/>
+              <a:t>() sets a logical size for the content, rendering to an offscreen texture and then scaling it as needed for presentation</a:t>
+            </a:r>
+          </a:p>
+          <a:p>
+            <a:pPr lvl="1"/>
+            <a:r>
+              <a:rPr lang="en-US" dirty="0" err="1"/>
+              <a:t>SDL_RenderCoordinatesToWindow</a:t>
+            </a:r>
+            <a:r>
+              <a:rPr lang="en-US" dirty="0"/>
+              <a:t>() and </a:t>
+            </a:r>
+            <a:r>
+              <a:rPr lang="en-US" dirty="0" err="1"/>
+              <a:t>SDL_RenderCoordinatesFromWindow</a:t>
+            </a:r>
+            <a:r>
+              <a:rPr lang="en-US" dirty="0"/>
+              <a:t>() convert between screen coordinates and coordinates in the render viewport</a:t>
+            </a:r>
+          </a:p>
+          <a:p>
+            <a:pPr lvl="1"/>
+            <a:r>
+              <a:rPr lang="en-US" dirty="0" err="1"/>
+              <a:t>SDL_ConvertEventToRenderCoordinates</a:t>
+            </a:r>
+            <a:r>
+              <a:rPr lang="en-US" dirty="0"/>
+              <a:t>() will convert all coordinates in an event into coordinates in the render viewport</a:t>
+            </a:r>
           </a:p>
         </p:txBody>
       </p:sp>
-      <p:pic>
-        <p:nvPicPr>
-          <p:cNvPr id="3" name="Graphic 2">
-            <a:extLst>
-              <a:ext uri="{FF2B5EF4-FFF2-40B4-BE49-F238E27FC236}">
-                <a16:creationId xmlns:a16="http://schemas.microsoft.com/office/drawing/2014/main" id="{FCB44906-DADD-46ED-92F9-39B68AD59568}"/>
-              </a:ext>
-            </a:extLst>
-          </p:cNvPr>
-          <p:cNvPicPr>
-            <a:picLocks noChangeAspect="1"/>
-          </p:cNvPicPr>
-          <p:nvPr/>
-        </p:nvPicPr>
-        <p:blipFill>
-          <a:blip r:embed="rId3" cstate="print">
-            <a:extLst>
-              <a:ext uri="{28A0092B-C50C-407E-A947-70E740481C1C}">
-                <a14:useLocalDpi xmlns:a14="http://schemas.microsoft.com/office/drawing/2010/main" val="0"/>
-              </a:ext>
-              <a:ext uri="{96DAC541-7B7A-43D3-8B79-37D633B846F1}">
-                <asvg:svgBlip xmlns:asvg="http://schemas.microsoft.com/office/drawing/2016/SVG/main" r:embed="rId4"/>
-              </a:ext>
-            </a:extLst>
-          </a:blip>
-          <a:stretch>
-            <a:fillRect/>
-          </a:stretch>
-        </p:blipFill>
-        <p:spPr>
-          <a:xfrm>
-            <a:off x="5918200" y="3509736"/>
-            <a:ext cx="4572000" cy="4572000"/>
-          </a:xfrm>
-          <a:prstGeom prst="rect">
-            <a:avLst/>
-          </a:prstGeom>
-        </p:spPr>
-      </p:pic>
     </p:spTree>
     <p:extLst>
       <p:ext uri="{BB962C8B-B14F-4D97-AF65-F5344CB8AC3E}">
-        <p14:creationId xmlns:p14="http://schemas.microsoft.com/office/powerpoint/2010/main" val="2597519295"/>
+        <p14:creationId xmlns:p14="http://schemas.microsoft.com/office/powerpoint/2010/main" val="1128643442"/>
       </p:ext>
     </p:extLst>
   </p:cSld>
@@ -7393,7 +7783,7 @@
         </p:spPr>
         <p:txBody>
           <a:bodyPr>
-            <a:normAutofit fontScale="92500" lnSpcReduction="10000"/>
+            <a:normAutofit fontScale="92500"/>
           </a:bodyPr>
           <a:lstStyle>
             <a:lvl1pPr marL="0" indent="0">
@@ -7451,44 +7841,37 @@
           </a:lstStyle>
           <a:p>
             <a:r>
-              <a:rPr lang="en-US" dirty="0"/>
-              <a:t> Considerations:</a:t>
+              <a:rPr lang="en-US"/>
+              <a:t> High DPI events:</a:t>
             </a:r>
           </a:p>
           <a:p>
             <a:pPr lvl="1"/>
             <a:r>
-              <a:rPr lang="en-US" dirty="0"/>
-              <a:t>Fullscreen desktop windows use screen coordinates</a:t>
+              <a:rPr lang="en-US"/>
+              <a:t>SDL_EVENT_WINDOW_RESIZED is sent when a window is resized in screen coordinates</a:t>
             </a:r>
           </a:p>
           <a:p>
             <a:pPr lvl="1"/>
             <a:r>
-              <a:rPr lang="en-US" dirty="0"/>
-              <a:t>Unusual scaling factors can result in rounding, e.g. 1920 pixel wide display at 175% scale gives a screen coordinate width of 1097.143, rounded to 1097</a:t>
+              <a:rPr lang="en-US"/>
+              <a:t>SDL_EVENT_WINDOW_PIXEL_SIZE_CHANGED is sent when the size of a window’s </a:t>
+            </a:r>
+            <a:r>
+              <a:rPr lang="en-US" err="1"/>
+              <a:t>backbuffer</a:t>
+            </a:r>
+            <a:r>
+              <a:rPr lang="en-US"/>
+              <a:t> has changed, which can happen when moving between high and low density displays</a:t>
             </a:r>
           </a:p>
           <a:p>
             <a:pPr lvl="1"/>
             <a:r>
-              <a:rPr lang="en-US" dirty="0"/>
-              <a:t>True </a:t>
-            </a:r>
-            <a:r>
-              <a:rPr lang="en-US" dirty="0" err="1"/>
-              <a:t>fullscreen</a:t>
-            </a:r>
-            <a:r>
-              <a:rPr lang="en-US" dirty="0"/>
-              <a:t> modes always have an integer scale, usually 1, but desktop scale should still be applied as a content scale as appropriate</a:t>
-            </a:r>
-          </a:p>
-          <a:p>
-            <a:pPr lvl="1"/>
-            <a:r>
-              <a:rPr lang="en-US" dirty="0"/>
-              <a:t>Mouse coordinates have floating point precision, usually centered on pixels</a:t>
+              <a:rPr lang="en-US"/>
+              <a:t>SDL_EVENT_DISPLAY_SCALE_CHANGED is sent when a display changes scale, which also triggers window pixel size events</a:t>
             </a:r>
           </a:p>
         </p:txBody>
@@ -7496,7 +7879,7 @@
     </p:spTree>
     <p:extLst>
       <p:ext uri="{BB962C8B-B14F-4D97-AF65-F5344CB8AC3E}">
-        <p14:creationId xmlns:p14="http://schemas.microsoft.com/office/powerpoint/2010/main" val="1523892666"/>
+        <p14:creationId xmlns:p14="http://schemas.microsoft.com/office/powerpoint/2010/main" val="3390475410"/>
       </p:ext>
     </p:extLst>
   </p:cSld>
@@ -7644,21 +8027,19 @@
           <a:p>
             <a:r>
               <a:rPr lang="en-US" dirty="0"/>
-              <a:t> High DPI support is becoming more important as displays become higher and higher resolution</a:t>
-            </a:r>
-          </a:p>
-          <a:p>
-            <a:r>
-              <a:rPr lang="en-US" dirty="0"/>
-              <a:t> SDL gives you a consistent way of handling high DPI scenarios across </a:t>
-            </a:r>
-            <a:r>
-              <a:rPr lang="en-US"/>
-              <a:t>all operating </a:t>
-            </a:r>
-            <a:r>
-              <a:rPr lang="en-US" dirty="0"/>
-              <a:t>systems</a:t>
+              <a:t> SDL gives you a consistent way of handling high DPI scenarios across all operating systems</a:t>
+            </a:r>
+          </a:p>
+          <a:p>
+            <a:r>
+              <a:rPr lang="en-US" dirty="0"/>
+              <a:t> Your game should handle floating point mouse coordinates, and window sizes that are different than your back buffer sizes</a:t>
+            </a:r>
+          </a:p>
+          <a:p>
+            <a:r>
+              <a:rPr lang="en-US" dirty="0"/>
+              <a:t> When you get a pixel size changed event, just rebuild your back buffer</a:t>
             </a:r>
           </a:p>
         </p:txBody>
@@ -7911,13 +8292,6 @@
               <a:rPr lang="en-US" dirty="0"/>
               <a:t> Even in 2D, the thing people want is shaders</a:t>
             </a:r>
-          </a:p>
-          <a:p>
-            <a:r>
-              <a:rPr lang="en-US" dirty="0"/>
-              <a:t> State machine APIs cause trouble</a:t>
-            </a:r>
-            <a:endParaRPr dirty="0"/>
           </a:p>
         </p:txBody>
       </p:sp>
@@ -8458,7 +8832,7 @@
           <a:p>
             <a:r>
               <a:rPr lang="en-US" dirty="0"/>
-              <a:t> Command queues, pipelines, shaders, fences</a:t>
+              <a:t> Command queues, pipelines, PSOs, shaders, fences</a:t>
             </a:r>
           </a:p>
           <a:p>
@@ -9734,7 +10108,7 @@
             </a:r>
             <a:r>
               <a:rPr lang="en-US" dirty="0">
-                <a:hlinkClick r:id="rId2"/>
+                <a:hlinkClick r:id="rId3"/>
               </a:rPr>
               <a:t>slouken@libsdl.org</a:t>
             </a:r>
@@ -9744,7 +10118,7 @@
             </a:r>
             <a:r>
               <a:rPr lang="en-US" dirty="0">
-                <a:hlinkClick r:id="rId3"/>
+                <a:hlinkClick r:id="rId4"/>
               </a:rPr>
               <a:t>icculus@icculus.org</a:t>
             </a:r>
@@ -9760,7 +10134,7 @@
             </a:r>
             <a:r>
               <a:rPr lang="en-US" dirty="0">
-                <a:hlinkClick r:id="rId4"/>
+                <a:hlinkClick r:id="rId5"/>
               </a:rPr>
               <a:t>https://www.libsdl.org/gdc2023</a:t>
             </a:r>
@@ -9789,13 +10163,13 @@
           <p:nvPr/>
         </p:nvPicPr>
         <p:blipFill>
-          <a:blip r:embed="rId5" cstate="print">
+          <a:blip r:embed="rId6" cstate="print">
             <a:extLst>
               <a:ext uri="{28A0092B-C50C-407E-A947-70E740481C1C}">
                 <a14:useLocalDpi xmlns:a14="http://schemas.microsoft.com/office/drawing/2010/main" val="0"/>
               </a:ext>
               <a:ext uri="{96DAC541-7B7A-43D3-8B79-37D633B846F1}">
-                <asvg:svgBlip xmlns:asvg="http://schemas.microsoft.com/office/drawing/2016/SVG/main" r:embed="rId6"/>
+                <asvg:svgBlip xmlns:asvg="http://schemas.microsoft.com/office/drawing/2016/SVG/main" r:embed="rId7"/>
               </a:ext>
             </a:extLst>
           </a:blip>

</xml_diff>